<commit_message>
Updated doc, and added crisprRater
</commit_message>
<xml_diff>
--- a/vignettes/figures/sequences_cas9.pptx
+++ b/vignettes/figures/sequences_cas9.pptx
@@ -2,12 +2,15 @@
 <file path=ppt/presentation.xml><?xml version="1.0" encoding="utf-8"?>
 <p:presentation xmlns:a="http://schemas.openxmlformats.org/drawingml/2006/main" xmlns:r="http://schemas.openxmlformats.org/officeDocument/2006/relationships" xmlns:p="http://schemas.openxmlformats.org/presentationml/2006/main" saveSubsetFonts="1" autoCompressPictures="0">
   <p:sldMasterIdLst>
-    <p:sldMasterId id="2147483708" r:id="rId1"/>
+    <p:sldMasterId id="2147483756" r:id="rId1"/>
   </p:sldMasterIdLst>
+  <p:notesMasterIdLst>
+    <p:notesMasterId r:id="rId3"/>
+  </p:notesMasterIdLst>
   <p:sldIdLst>
     <p:sldId id="257" r:id="rId2"/>
   </p:sldIdLst>
-  <p:sldSz cx="12344400" cy="4572000"/>
+  <p:sldSz cx="12344400" cy="4754563"/>
   <p:notesSz cx="6858000" cy="9144000"/>
   <p:defaultTextStyle>
     <a:defPPr>
@@ -112,6 +115,444 @@
 </p:presentation>
 </file>
 
+<file path=ppt/notesMasters/notesMaster1.xml><?xml version="1.0" encoding="utf-8"?>
+<p:notesMaster xmlns:a="http://schemas.openxmlformats.org/drawingml/2006/main" xmlns:r="http://schemas.openxmlformats.org/officeDocument/2006/relationships" xmlns:p="http://schemas.openxmlformats.org/presentationml/2006/main">
+  <p:cSld>
+    <p:bg>
+      <p:bgRef idx="1001">
+        <a:schemeClr val="bg1"/>
+      </p:bgRef>
+    </p:bg>
+    <p:spTree>
+      <p:nvGrpSpPr>
+        <p:cNvPr id="1" name=""/>
+        <p:cNvGrpSpPr/>
+        <p:nvPr/>
+      </p:nvGrpSpPr>
+      <p:grpSpPr>
+        <a:xfrm>
+          <a:off x="0" y="0"/>
+          <a:ext cx="0" cy="0"/>
+          <a:chOff x="0" y="0"/>
+          <a:chExt cx="0" cy="0"/>
+        </a:xfrm>
+      </p:grpSpPr>
+      <p:sp>
+        <p:nvSpPr>
+          <p:cNvPr id="2" name="Header Placeholder 1"/>
+          <p:cNvSpPr>
+            <a:spLocks noGrp="1"/>
+          </p:cNvSpPr>
+          <p:nvPr>
+            <p:ph type="hdr" sz="quarter"/>
+          </p:nvPr>
+        </p:nvSpPr>
+        <p:spPr>
+          <a:xfrm>
+            <a:off x="0" y="0"/>
+            <a:ext cx="2971800" cy="458788"/>
+          </a:xfrm>
+          <a:prstGeom prst="rect">
+            <a:avLst/>
+          </a:prstGeom>
+        </p:spPr>
+        <p:txBody>
+          <a:bodyPr vert="horz" lIns="91440" tIns="45720" rIns="91440" bIns="45720" rtlCol="0"/>
+          <a:lstStyle>
+            <a:lvl1pPr algn="l">
+              <a:defRPr sz="1200"/>
+            </a:lvl1pPr>
+          </a:lstStyle>
+          <a:p>
+            <a:endParaRPr lang="en-US"/>
+          </a:p>
+        </p:txBody>
+      </p:sp>
+      <p:sp>
+        <p:nvSpPr>
+          <p:cNvPr id="3" name="Date Placeholder 2"/>
+          <p:cNvSpPr>
+            <a:spLocks noGrp="1"/>
+          </p:cNvSpPr>
+          <p:nvPr>
+            <p:ph type="dt" idx="1"/>
+          </p:nvPr>
+        </p:nvSpPr>
+        <p:spPr>
+          <a:xfrm>
+            <a:off x="3884613" y="0"/>
+            <a:ext cx="2971800" cy="458788"/>
+          </a:xfrm>
+          <a:prstGeom prst="rect">
+            <a:avLst/>
+          </a:prstGeom>
+        </p:spPr>
+        <p:txBody>
+          <a:bodyPr vert="horz" lIns="91440" tIns="45720" rIns="91440" bIns="45720" rtlCol="0"/>
+          <a:lstStyle>
+            <a:lvl1pPr algn="r">
+              <a:defRPr sz="1200"/>
+            </a:lvl1pPr>
+          </a:lstStyle>
+          <a:p>
+            <a:fld id="{9735EE8D-AAE5-5944-A858-0F27626AA23E}" type="datetimeFigureOut">
+              <a:rPr lang="en-US" smtClean="0"/>
+              <a:t>6/23/22</a:t>
+            </a:fld>
+            <a:endParaRPr lang="en-US"/>
+          </a:p>
+        </p:txBody>
+      </p:sp>
+      <p:sp>
+        <p:nvSpPr>
+          <p:cNvPr id="4" name="Slide Image Placeholder 3"/>
+          <p:cNvSpPr>
+            <a:spLocks noGrp="1" noRot="1" noChangeAspect="1"/>
+          </p:cNvSpPr>
+          <p:nvPr>
+            <p:ph type="sldImg" idx="2"/>
+          </p:nvPr>
+        </p:nvSpPr>
+        <p:spPr>
+          <a:xfrm>
+            <a:off x="-576263" y="1143000"/>
+            <a:ext cx="8010526" cy="3086100"/>
+          </a:xfrm>
+          <a:prstGeom prst="rect">
+            <a:avLst/>
+          </a:prstGeom>
+          <a:noFill/>
+          <a:ln w="12700">
+            <a:solidFill>
+              <a:prstClr val="black"/>
+            </a:solidFill>
+          </a:ln>
+        </p:spPr>
+        <p:txBody>
+          <a:bodyPr vert="horz" lIns="91440" tIns="45720" rIns="91440" bIns="45720" rtlCol="0" anchor="ctr"/>
+          <a:lstStyle/>
+          <a:p>
+            <a:endParaRPr lang="en-US"/>
+          </a:p>
+        </p:txBody>
+      </p:sp>
+      <p:sp>
+        <p:nvSpPr>
+          <p:cNvPr id="5" name="Notes Placeholder 4"/>
+          <p:cNvSpPr>
+            <a:spLocks noGrp="1"/>
+          </p:cNvSpPr>
+          <p:nvPr>
+            <p:ph type="body" sz="quarter" idx="3"/>
+          </p:nvPr>
+        </p:nvSpPr>
+        <p:spPr>
+          <a:xfrm>
+            <a:off x="685800" y="4400550"/>
+            <a:ext cx="5486400" cy="3600450"/>
+          </a:xfrm>
+          <a:prstGeom prst="rect">
+            <a:avLst/>
+          </a:prstGeom>
+        </p:spPr>
+        <p:txBody>
+          <a:bodyPr vert="horz" lIns="91440" tIns="45720" rIns="91440" bIns="45720" rtlCol="0"/>
+          <a:lstStyle/>
+          <a:p>
+            <a:pPr lvl="0"/>
+            <a:r>
+              <a:rPr lang="en-US"/>
+              <a:t>Click to edit Master text styles</a:t>
+            </a:r>
+          </a:p>
+          <a:p>
+            <a:pPr lvl="1"/>
+            <a:r>
+              <a:rPr lang="en-US"/>
+              <a:t>Second level</a:t>
+            </a:r>
+          </a:p>
+          <a:p>
+            <a:pPr lvl="2"/>
+            <a:r>
+              <a:rPr lang="en-US"/>
+              <a:t>Third level</a:t>
+            </a:r>
+          </a:p>
+          <a:p>
+            <a:pPr lvl="3"/>
+            <a:r>
+              <a:rPr lang="en-US"/>
+              <a:t>Fourth level</a:t>
+            </a:r>
+          </a:p>
+          <a:p>
+            <a:pPr lvl="4"/>
+            <a:r>
+              <a:rPr lang="en-US"/>
+              <a:t>Fifth level</a:t>
+            </a:r>
+          </a:p>
+        </p:txBody>
+      </p:sp>
+      <p:sp>
+        <p:nvSpPr>
+          <p:cNvPr id="6" name="Footer Placeholder 5"/>
+          <p:cNvSpPr>
+            <a:spLocks noGrp="1"/>
+          </p:cNvSpPr>
+          <p:nvPr>
+            <p:ph type="ftr" sz="quarter" idx="4"/>
+          </p:nvPr>
+        </p:nvSpPr>
+        <p:spPr>
+          <a:xfrm>
+            <a:off x="0" y="8685213"/>
+            <a:ext cx="2971800" cy="458787"/>
+          </a:xfrm>
+          <a:prstGeom prst="rect">
+            <a:avLst/>
+          </a:prstGeom>
+        </p:spPr>
+        <p:txBody>
+          <a:bodyPr vert="horz" lIns="91440" tIns="45720" rIns="91440" bIns="45720" rtlCol="0" anchor="b"/>
+          <a:lstStyle>
+            <a:lvl1pPr algn="l">
+              <a:defRPr sz="1200"/>
+            </a:lvl1pPr>
+          </a:lstStyle>
+          <a:p>
+            <a:endParaRPr lang="en-US"/>
+          </a:p>
+        </p:txBody>
+      </p:sp>
+      <p:sp>
+        <p:nvSpPr>
+          <p:cNvPr id="7" name="Slide Number Placeholder 6"/>
+          <p:cNvSpPr>
+            <a:spLocks noGrp="1"/>
+          </p:cNvSpPr>
+          <p:nvPr>
+            <p:ph type="sldNum" sz="quarter" idx="5"/>
+          </p:nvPr>
+        </p:nvSpPr>
+        <p:spPr>
+          <a:xfrm>
+            <a:off x="3884613" y="8685213"/>
+            <a:ext cx="2971800" cy="458787"/>
+          </a:xfrm>
+          <a:prstGeom prst="rect">
+            <a:avLst/>
+          </a:prstGeom>
+        </p:spPr>
+        <p:txBody>
+          <a:bodyPr vert="horz" lIns="91440" tIns="45720" rIns="91440" bIns="45720" rtlCol="0" anchor="b"/>
+          <a:lstStyle>
+            <a:lvl1pPr algn="r">
+              <a:defRPr sz="1200"/>
+            </a:lvl1pPr>
+          </a:lstStyle>
+          <a:p>
+            <a:fld id="{8CFFED38-D4E9-F04C-A133-14BFB8D33A85}" type="slidenum">
+              <a:rPr lang="en-US" smtClean="0"/>
+              <a:t>‹#›</a:t>
+            </a:fld>
+            <a:endParaRPr lang="en-US"/>
+          </a:p>
+        </p:txBody>
+      </p:sp>
+    </p:spTree>
+    <p:extLst>
+      <p:ext uri="{BB962C8B-B14F-4D97-AF65-F5344CB8AC3E}">
+        <p14:creationId xmlns:p14="http://schemas.microsoft.com/office/powerpoint/2010/main" val="861760188"/>
+      </p:ext>
+    </p:extLst>
+  </p:cSld>
+  <p:clrMap bg1="lt1" tx1="dk1" bg2="lt2" tx2="dk2" accent1="accent1" accent2="accent2" accent3="accent3" accent4="accent4" accent5="accent5" accent6="accent6" hlink="hlink" folHlink="folHlink"/>
+  <p:notesStyle>
+    <a:lvl1pPr marL="0" algn="l" defTabSz="914400" rtl="0" eaLnBrk="1" latinLnBrk="0" hangingPunct="1">
+      <a:defRPr sz="1200" kern="1200">
+        <a:solidFill>
+          <a:schemeClr val="tx1"/>
+        </a:solidFill>
+        <a:latin typeface="+mn-lt"/>
+        <a:ea typeface="+mn-ea"/>
+        <a:cs typeface="+mn-cs"/>
+      </a:defRPr>
+    </a:lvl1pPr>
+    <a:lvl2pPr marL="457200" algn="l" defTabSz="914400" rtl="0" eaLnBrk="1" latinLnBrk="0" hangingPunct="1">
+      <a:defRPr sz="1200" kern="1200">
+        <a:solidFill>
+          <a:schemeClr val="tx1"/>
+        </a:solidFill>
+        <a:latin typeface="+mn-lt"/>
+        <a:ea typeface="+mn-ea"/>
+        <a:cs typeface="+mn-cs"/>
+      </a:defRPr>
+    </a:lvl2pPr>
+    <a:lvl3pPr marL="914400" algn="l" defTabSz="914400" rtl="0" eaLnBrk="1" latinLnBrk="0" hangingPunct="1">
+      <a:defRPr sz="1200" kern="1200">
+        <a:solidFill>
+          <a:schemeClr val="tx1"/>
+        </a:solidFill>
+        <a:latin typeface="+mn-lt"/>
+        <a:ea typeface="+mn-ea"/>
+        <a:cs typeface="+mn-cs"/>
+      </a:defRPr>
+    </a:lvl3pPr>
+    <a:lvl4pPr marL="1371600" algn="l" defTabSz="914400" rtl="0" eaLnBrk="1" latinLnBrk="0" hangingPunct="1">
+      <a:defRPr sz="1200" kern="1200">
+        <a:solidFill>
+          <a:schemeClr val="tx1"/>
+        </a:solidFill>
+        <a:latin typeface="+mn-lt"/>
+        <a:ea typeface="+mn-ea"/>
+        <a:cs typeface="+mn-cs"/>
+      </a:defRPr>
+    </a:lvl4pPr>
+    <a:lvl5pPr marL="1828800" algn="l" defTabSz="914400" rtl="0" eaLnBrk="1" latinLnBrk="0" hangingPunct="1">
+      <a:defRPr sz="1200" kern="1200">
+        <a:solidFill>
+          <a:schemeClr val="tx1"/>
+        </a:solidFill>
+        <a:latin typeface="+mn-lt"/>
+        <a:ea typeface="+mn-ea"/>
+        <a:cs typeface="+mn-cs"/>
+      </a:defRPr>
+    </a:lvl5pPr>
+    <a:lvl6pPr marL="2286000" algn="l" defTabSz="914400" rtl="0" eaLnBrk="1" latinLnBrk="0" hangingPunct="1">
+      <a:defRPr sz="1200" kern="1200">
+        <a:solidFill>
+          <a:schemeClr val="tx1"/>
+        </a:solidFill>
+        <a:latin typeface="+mn-lt"/>
+        <a:ea typeface="+mn-ea"/>
+        <a:cs typeface="+mn-cs"/>
+      </a:defRPr>
+    </a:lvl6pPr>
+    <a:lvl7pPr marL="2743200" algn="l" defTabSz="914400" rtl="0" eaLnBrk="1" latinLnBrk="0" hangingPunct="1">
+      <a:defRPr sz="1200" kern="1200">
+        <a:solidFill>
+          <a:schemeClr val="tx1"/>
+        </a:solidFill>
+        <a:latin typeface="+mn-lt"/>
+        <a:ea typeface="+mn-ea"/>
+        <a:cs typeface="+mn-cs"/>
+      </a:defRPr>
+    </a:lvl7pPr>
+    <a:lvl8pPr marL="3200400" algn="l" defTabSz="914400" rtl="0" eaLnBrk="1" latinLnBrk="0" hangingPunct="1">
+      <a:defRPr sz="1200" kern="1200">
+        <a:solidFill>
+          <a:schemeClr val="tx1"/>
+        </a:solidFill>
+        <a:latin typeface="+mn-lt"/>
+        <a:ea typeface="+mn-ea"/>
+        <a:cs typeface="+mn-cs"/>
+      </a:defRPr>
+    </a:lvl8pPr>
+    <a:lvl9pPr marL="3657600" algn="l" defTabSz="914400" rtl="0" eaLnBrk="1" latinLnBrk="0" hangingPunct="1">
+      <a:defRPr sz="1200" kern="1200">
+        <a:solidFill>
+          <a:schemeClr val="tx1"/>
+        </a:solidFill>
+        <a:latin typeface="+mn-lt"/>
+        <a:ea typeface="+mn-ea"/>
+        <a:cs typeface="+mn-cs"/>
+      </a:defRPr>
+    </a:lvl9pPr>
+  </p:notesStyle>
+</p:notesMaster>
+</file>
+
+<file path=ppt/notesSlides/notesSlide1.xml><?xml version="1.0" encoding="utf-8"?>
+<p:notes xmlns:a="http://schemas.openxmlformats.org/drawingml/2006/main" xmlns:r="http://schemas.openxmlformats.org/officeDocument/2006/relationships" xmlns:p="http://schemas.openxmlformats.org/presentationml/2006/main">
+  <p:cSld>
+    <p:spTree>
+      <p:nvGrpSpPr>
+        <p:cNvPr id="1" name=""/>
+        <p:cNvGrpSpPr/>
+        <p:nvPr/>
+      </p:nvGrpSpPr>
+      <p:grpSpPr>
+        <a:xfrm>
+          <a:off x="0" y="0"/>
+          <a:ext cx="0" cy="0"/>
+          <a:chOff x="0" y="0"/>
+          <a:chExt cx="0" cy="0"/>
+        </a:xfrm>
+      </p:grpSpPr>
+      <p:sp>
+        <p:nvSpPr>
+          <p:cNvPr id="2" name="Slide Image Placeholder 1"/>
+          <p:cNvSpPr>
+            <a:spLocks noGrp="1" noRot="1" noChangeAspect="1"/>
+          </p:cNvSpPr>
+          <p:nvPr>
+            <p:ph type="sldImg"/>
+          </p:nvPr>
+        </p:nvSpPr>
+        <p:spPr>
+          <a:xfrm>
+            <a:off x="-576263" y="1143000"/>
+            <a:ext cx="8010526" cy="3086100"/>
+          </a:xfrm>
+        </p:spPr>
+      </p:sp>
+      <p:sp>
+        <p:nvSpPr>
+          <p:cNvPr id="3" name="Notes Placeholder 2"/>
+          <p:cNvSpPr>
+            <a:spLocks noGrp="1"/>
+          </p:cNvSpPr>
+          <p:nvPr>
+            <p:ph type="body" idx="1"/>
+          </p:nvPr>
+        </p:nvSpPr>
+        <p:spPr/>
+        <p:txBody>
+          <a:bodyPr/>
+          <a:lstStyle/>
+          <a:p>
+            <a:endParaRPr lang="en-US" dirty="0"/>
+          </a:p>
+        </p:txBody>
+      </p:sp>
+      <p:sp>
+        <p:nvSpPr>
+          <p:cNvPr id="4" name="Slide Number Placeholder 3"/>
+          <p:cNvSpPr>
+            <a:spLocks noGrp="1"/>
+          </p:cNvSpPr>
+          <p:nvPr>
+            <p:ph type="sldNum" sz="quarter" idx="5"/>
+          </p:nvPr>
+        </p:nvSpPr>
+        <p:spPr/>
+        <p:txBody>
+          <a:bodyPr/>
+          <a:lstStyle/>
+          <a:p>
+            <a:fld id="{8CFFED38-D4E9-F04C-A133-14BFB8D33A85}" type="slidenum">
+              <a:rPr lang="en-US" smtClean="0"/>
+              <a:t>1</a:t>
+            </a:fld>
+            <a:endParaRPr lang="en-US"/>
+          </a:p>
+        </p:txBody>
+      </p:sp>
+    </p:spTree>
+    <p:extLst>
+      <p:ext uri="{BB962C8B-B14F-4D97-AF65-F5344CB8AC3E}">
+        <p14:creationId xmlns:p14="http://schemas.microsoft.com/office/powerpoint/2010/main" val="2204219763"/>
+      </p:ext>
+    </p:extLst>
+  </p:cSld>
+  <p:clrMapOvr>
+    <a:masterClrMapping/>
+  </p:clrMapOvr>
+</p:notes>
+</file>
+
 <file path=ppt/slideLayouts/slideLayout1.xml><?xml version="1.0" encoding="utf-8"?>
 <p:sldLayout xmlns:a="http://schemas.openxmlformats.org/drawingml/2006/main" xmlns:r="http://schemas.openxmlformats.org/officeDocument/2006/relationships" xmlns:p="http://schemas.openxmlformats.org/presentationml/2006/main" type="title" preserve="1">
   <p:cSld name="Title Slide">
@@ -141,15 +582,15 @@
         </p:nvSpPr>
         <p:spPr>
           <a:xfrm>
-            <a:off x="1543050" y="748242"/>
-            <a:ext cx="9258300" cy="1591733"/>
+            <a:off x="1543050" y="778120"/>
+            <a:ext cx="9258300" cy="1655292"/>
           </a:xfrm>
         </p:spPr>
         <p:txBody>
           <a:bodyPr anchor="b"/>
           <a:lstStyle>
             <a:lvl1pPr algn="ctr">
-              <a:defRPr sz="4000"/>
+              <a:defRPr sz="4160"/>
             </a:lvl1pPr>
           </a:lstStyle>
           <a:p>
@@ -173,8 +614,8 @@
         </p:nvSpPr>
         <p:spPr>
           <a:xfrm>
-            <a:off x="1543050" y="2401359"/>
-            <a:ext cx="9258300" cy="1103841"/>
+            <a:off x="1543050" y="2497247"/>
+            <a:ext cx="9258300" cy="1147918"/>
           </a:xfrm>
         </p:spPr>
         <p:txBody>
@@ -182,39 +623,39 @@
           <a:lstStyle>
             <a:lvl1pPr marL="0" indent="0" algn="ctr">
               <a:buNone/>
-              <a:defRPr sz="1600"/>
+              <a:defRPr sz="1664"/>
             </a:lvl1pPr>
-            <a:lvl2pPr marL="304815" indent="0" algn="ctr">
+            <a:lvl2pPr marL="316977" indent="0" algn="ctr">
               <a:buNone/>
-              <a:defRPr sz="1333"/>
+              <a:defRPr sz="1387"/>
             </a:lvl2pPr>
-            <a:lvl3pPr marL="609630" indent="0" algn="ctr">
+            <a:lvl3pPr marL="633954" indent="0" algn="ctr">
               <a:buNone/>
-              <a:defRPr sz="1200"/>
+              <a:defRPr sz="1248"/>
             </a:lvl3pPr>
-            <a:lvl4pPr marL="914446" indent="0" algn="ctr">
+            <a:lvl4pPr marL="950930" indent="0" algn="ctr">
               <a:buNone/>
-              <a:defRPr sz="1067"/>
+              <a:defRPr sz="1109"/>
             </a:lvl4pPr>
-            <a:lvl5pPr marL="1219261" indent="0" algn="ctr">
+            <a:lvl5pPr marL="1267907" indent="0" algn="ctr">
               <a:buNone/>
-              <a:defRPr sz="1067"/>
+              <a:defRPr sz="1109"/>
             </a:lvl5pPr>
-            <a:lvl6pPr marL="1524076" indent="0" algn="ctr">
+            <a:lvl6pPr marL="1584884" indent="0" algn="ctr">
               <a:buNone/>
-              <a:defRPr sz="1067"/>
+              <a:defRPr sz="1109"/>
             </a:lvl6pPr>
-            <a:lvl7pPr marL="1828891" indent="0" algn="ctr">
+            <a:lvl7pPr marL="1901861" indent="0" algn="ctr">
               <a:buNone/>
-              <a:defRPr sz="1067"/>
+              <a:defRPr sz="1109"/>
             </a:lvl7pPr>
-            <a:lvl8pPr marL="2133707" indent="0" algn="ctr">
+            <a:lvl8pPr marL="2218837" indent="0" algn="ctr">
               <a:buNone/>
-              <a:defRPr sz="1067"/>
+              <a:defRPr sz="1109"/>
             </a:lvl8pPr>
-            <a:lvl9pPr marL="2438522" indent="0" algn="ctr">
+            <a:lvl9pPr marL="2535814" indent="0" algn="ctr">
               <a:buNone/>
-              <a:defRPr sz="1067"/>
+              <a:defRPr sz="1109"/>
             </a:lvl9pPr>
           </a:lstStyle>
           <a:p>
@@ -243,7 +684,7 @@
           <a:p>
             <a:fld id="{DD6D9246-4FED-8E4D-BC9B-CDD794F2A5B7}" type="datetimeFigureOut">
               <a:rPr lang="en-US" smtClean="0"/>
-              <a:t>2/11/22</a:t>
+              <a:t>6/23/22</a:t>
             </a:fld>
             <a:endParaRPr lang="en-US"/>
           </a:p>
@@ -294,7 +735,7 @@
     </p:spTree>
     <p:extLst>
       <p:ext uri="{BB962C8B-B14F-4D97-AF65-F5344CB8AC3E}">
-        <p14:creationId xmlns:p14="http://schemas.microsoft.com/office/powerpoint/2010/main" val="897427278"/>
+        <p14:creationId xmlns:p14="http://schemas.microsoft.com/office/powerpoint/2010/main" val="3378003944"/>
       </p:ext>
     </p:extLst>
   </p:cSld>
@@ -413,7 +854,7 @@
           <a:p>
             <a:fld id="{DD6D9246-4FED-8E4D-BC9B-CDD794F2A5B7}" type="datetimeFigureOut">
               <a:rPr lang="en-US" smtClean="0"/>
-              <a:t>2/11/22</a:t>
+              <a:t>6/23/22</a:t>
             </a:fld>
             <a:endParaRPr lang="en-US"/>
           </a:p>
@@ -464,7 +905,7 @@
     </p:spTree>
     <p:extLst>
       <p:ext uri="{BB962C8B-B14F-4D97-AF65-F5344CB8AC3E}">
-        <p14:creationId xmlns:p14="http://schemas.microsoft.com/office/powerpoint/2010/main" val="1852765551"/>
+        <p14:creationId xmlns:p14="http://schemas.microsoft.com/office/powerpoint/2010/main" val="3290246028"/>
       </p:ext>
     </p:extLst>
   </p:cSld>
@@ -503,8 +944,8 @@
         </p:nvSpPr>
         <p:spPr>
           <a:xfrm>
-            <a:off x="8833961" y="243417"/>
-            <a:ext cx="2661761" cy="3874559"/>
+            <a:off x="8833961" y="253137"/>
+            <a:ext cx="2661761" cy="4029272"/>
           </a:xfrm>
         </p:spPr>
         <p:txBody>
@@ -531,8 +972,8 @@
         </p:nvSpPr>
         <p:spPr>
           <a:xfrm>
-            <a:off x="848677" y="243417"/>
-            <a:ext cx="7830979" cy="3874559"/>
+            <a:off x="848677" y="253137"/>
+            <a:ext cx="7830979" cy="4029272"/>
           </a:xfrm>
         </p:spPr>
         <p:txBody>
@@ -593,7 +1034,7 @@
           <a:p>
             <a:fld id="{DD6D9246-4FED-8E4D-BC9B-CDD794F2A5B7}" type="datetimeFigureOut">
               <a:rPr lang="en-US" smtClean="0"/>
-              <a:t>2/11/22</a:t>
+              <a:t>6/23/22</a:t>
             </a:fld>
             <a:endParaRPr lang="en-US"/>
           </a:p>
@@ -644,7 +1085,7 @@
     </p:spTree>
     <p:extLst>
       <p:ext uri="{BB962C8B-B14F-4D97-AF65-F5344CB8AC3E}">
-        <p14:creationId xmlns:p14="http://schemas.microsoft.com/office/powerpoint/2010/main" val="4164035889"/>
+        <p14:creationId xmlns:p14="http://schemas.microsoft.com/office/powerpoint/2010/main" val="3017250443"/>
       </p:ext>
     </p:extLst>
   </p:cSld>
@@ -763,7 +1204,7 @@
           <a:p>
             <a:fld id="{DD6D9246-4FED-8E4D-BC9B-CDD794F2A5B7}" type="datetimeFigureOut">
               <a:rPr lang="en-US" smtClean="0"/>
-              <a:t>2/11/22</a:t>
+              <a:t>6/23/22</a:t>
             </a:fld>
             <a:endParaRPr lang="en-US"/>
           </a:p>
@@ -814,7 +1255,7 @@
     </p:spTree>
     <p:extLst>
       <p:ext uri="{BB962C8B-B14F-4D97-AF65-F5344CB8AC3E}">
-        <p14:creationId xmlns:p14="http://schemas.microsoft.com/office/powerpoint/2010/main" val="2197428051"/>
+        <p14:creationId xmlns:p14="http://schemas.microsoft.com/office/powerpoint/2010/main" val="2030343763"/>
       </p:ext>
     </p:extLst>
   </p:cSld>
@@ -853,15 +1294,15 @@
         </p:nvSpPr>
         <p:spPr>
           <a:xfrm>
-            <a:off x="842248" y="1139826"/>
-            <a:ext cx="10647045" cy="1901825"/>
+            <a:off x="842248" y="1185340"/>
+            <a:ext cx="10647045" cy="1977766"/>
           </a:xfrm>
         </p:spPr>
         <p:txBody>
           <a:bodyPr anchor="b"/>
           <a:lstStyle>
             <a:lvl1pPr>
-              <a:defRPr sz="4000"/>
+              <a:defRPr sz="4160"/>
             </a:lvl1pPr>
           </a:lstStyle>
           <a:p>
@@ -885,8 +1326,8 @@
         </p:nvSpPr>
         <p:spPr>
           <a:xfrm>
-            <a:off x="842248" y="3059642"/>
-            <a:ext cx="10647045" cy="1000125"/>
+            <a:off x="842248" y="3181816"/>
+            <a:ext cx="10647045" cy="1040060"/>
           </a:xfrm>
         </p:spPr>
         <p:txBody>
@@ -894,7 +1335,7 @@
           <a:lstStyle>
             <a:lvl1pPr marL="0" indent="0">
               <a:buNone/>
-              <a:defRPr sz="1600">
+              <a:defRPr sz="1664">
                 <a:solidFill>
                   <a:schemeClr val="tx1">
                     <a:tint val="75000"/>
@@ -902,9 +1343,9 @@
                 </a:solidFill>
               </a:defRPr>
             </a:lvl1pPr>
-            <a:lvl2pPr marL="304815" indent="0">
+            <a:lvl2pPr marL="316977" indent="0">
               <a:buNone/>
-              <a:defRPr sz="1333">
+              <a:defRPr sz="1387">
                 <a:solidFill>
                   <a:schemeClr val="tx1">
                     <a:tint val="75000"/>
@@ -912,9 +1353,9 @@
                 </a:solidFill>
               </a:defRPr>
             </a:lvl2pPr>
-            <a:lvl3pPr marL="609630" indent="0">
+            <a:lvl3pPr marL="633954" indent="0">
               <a:buNone/>
-              <a:defRPr sz="1200">
+              <a:defRPr sz="1248">
                 <a:solidFill>
                   <a:schemeClr val="tx1">
                     <a:tint val="75000"/>
@@ -922,9 +1363,9 @@
                 </a:solidFill>
               </a:defRPr>
             </a:lvl3pPr>
-            <a:lvl4pPr marL="914446" indent="0">
+            <a:lvl4pPr marL="950930" indent="0">
               <a:buNone/>
-              <a:defRPr sz="1067">
+              <a:defRPr sz="1109">
                 <a:solidFill>
                   <a:schemeClr val="tx1">
                     <a:tint val="75000"/>
@@ -932,9 +1373,9 @@
                 </a:solidFill>
               </a:defRPr>
             </a:lvl4pPr>
-            <a:lvl5pPr marL="1219261" indent="0">
+            <a:lvl5pPr marL="1267907" indent="0">
               <a:buNone/>
-              <a:defRPr sz="1067">
+              <a:defRPr sz="1109">
                 <a:solidFill>
                   <a:schemeClr val="tx1">
                     <a:tint val="75000"/>
@@ -942,9 +1383,9 @@
                 </a:solidFill>
               </a:defRPr>
             </a:lvl5pPr>
-            <a:lvl6pPr marL="1524076" indent="0">
+            <a:lvl6pPr marL="1584884" indent="0">
               <a:buNone/>
-              <a:defRPr sz="1067">
+              <a:defRPr sz="1109">
                 <a:solidFill>
                   <a:schemeClr val="tx1">
                     <a:tint val="75000"/>
@@ -952,9 +1393,9 @@
                 </a:solidFill>
               </a:defRPr>
             </a:lvl6pPr>
-            <a:lvl7pPr marL="1828891" indent="0">
+            <a:lvl7pPr marL="1901861" indent="0">
               <a:buNone/>
-              <a:defRPr sz="1067">
+              <a:defRPr sz="1109">
                 <a:solidFill>
                   <a:schemeClr val="tx1">
                     <a:tint val="75000"/>
@@ -962,9 +1403,9 @@
                 </a:solidFill>
               </a:defRPr>
             </a:lvl7pPr>
-            <a:lvl8pPr marL="2133707" indent="0">
+            <a:lvl8pPr marL="2218837" indent="0">
               <a:buNone/>
-              <a:defRPr sz="1067">
+              <a:defRPr sz="1109">
                 <a:solidFill>
                   <a:schemeClr val="tx1">
                     <a:tint val="75000"/>
@@ -972,9 +1413,9 @@
                 </a:solidFill>
               </a:defRPr>
             </a:lvl8pPr>
-            <a:lvl9pPr marL="2438522" indent="0">
+            <a:lvl9pPr marL="2535814" indent="0">
               <a:buNone/>
-              <a:defRPr sz="1067">
+              <a:defRPr sz="1109">
                 <a:solidFill>
                   <a:schemeClr val="tx1">
                     <a:tint val="75000"/>
@@ -1009,7 +1450,7 @@
           <a:p>
             <a:fld id="{DD6D9246-4FED-8E4D-BC9B-CDD794F2A5B7}" type="datetimeFigureOut">
               <a:rPr lang="en-US" smtClean="0"/>
-              <a:t>2/11/22</a:t>
+              <a:t>6/23/22</a:t>
             </a:fld>
             <a:endParaRPr lang="en-US"/>
           </a:p>
@@ -1060,7 +1501,7 @@
     </p:spTree>
     <p:extLst>
       <p:ext uri="{BB962C8B-B14F-4D97-AF65-F5344CB8AC3E}">
-        <p14:creationId xmlns:p14="http://schemas.microsoft.com/office/powerpoint/2010/main" val="3429102994"/>
+        <p14:creationId xmlns:p14="http://schemas.microsoft.com/office/powerpoint/2010/main" val="3987860263"/>
       </p:ext>
     </p:extLst>
   </p:cSld>
@@ -1122,8 +1563,8 @@
         </p:nvSpPr>
         <p:spPr>
           <a:xfrm>
-            <a:off x="848678" y="1217083"/>
-            <a:ext cx="5246370" cy="2900892"/>
+            <a:off x="848678" y="1265682"/>
+            <a:ext cx="5246370" cy="3016727"/>
           </a:xfrm>
         </p:spPr>
         <p:txBody>
@@ -1179,8 +1620,8 @@
         </p:nvSpPr>
         <p:spPr>
           <a:xfrm>
-            <a:off x="6249353" y="1217083"/>
-            <a:ext cx="5246370" cy="2900892"/>
+            <a:off x="6249353" y="1265682"/>
+            <a:ext cx="5246370" cy="3016727"/>
           </a:xfrm>
         </p:spPr>
         <p:txBody>
@@ -1241,7 +1682,7 @@
           <a:p>
             <a:fld id="{DD6D9246-4FED-8E4D-BC9B-CDD794F2A5B7}" type="datetimeFigureOut">
               <a:rPr lang="en-US" smtClean="0"/>
-              <a:t>2/11/22</a:t>
+              <a:t>6/23/22</a:t>
             </a:fld>
             <a:endParaRPr lang="en-US"/>
           </a:p>
@@ -1292,7 +1733,7 @@
     </p:spTree>
     <p:extLst>
       <p:ext uri="{BB962C8B-B14F-4D97-AF65-F5344CB8AC3E}">
-        <p14:creationId xmlns:p14="http://schemas.microsoft.com/office/powerpoint/2010/main" val="3533558518"/>
+        <p14:creationId xmlns:p14="http://schemas.microsoft.com/office/powerpoint/2010/main" val="3934672592"/>
       </p:ext>
     </p:extLst>
   </p:cSld>
@@ -1331,8 +1772,8 @@
         </p:nvSpPr>
         <p:spPr>
           <a:xfrm>
-            <a:off x="850285" y="243417"/>
-            <a:ext cx="10647045" cy="883709"/>
+            <a:off x="850285" y="253137"/>
+            <a:ext cx="10647045" cy="918996"/>
           </a:xfrm>
         </p:spPr>
         <p:txBody>
@@ -1359,8 +1800,8 @@
         </p:nvSpPr>
         <p:spPr>
           <a:xfrm>
-            <a:off x="850286" y="1120775"/>
-            <a:ext cx="5222259" cy="549275"/>
+            <a:off x="850286" y="1165528"/>
+            <a:ext cx="5222259" cy="571208"/>
           </a:xfrm>
         </p:spPr>
         <p:txBody>
@@ -1368,39 +1809,39 @@
           <a:lstStyle>
             <a:lvl1pPr marL="0" indent="0">
               <a:buNone/>
-              <a:defRPr sz="1600" b="1"/>
+              <a:defRPr sz="1664" b="1"/>
             </a:lvl1pPr>
-            <a:lvl2pPr marL="304815" indent="0">
+            <a:lvl2pPr marL="316977" indent="0">
               <a:buNone/>
-              <a:defRPr sz="1333" b="1"/>
+              <a:defRPr sz="1387" b="1"/>
             </a:lvl2pPr>
-            <a:lvl3pPr marL="609630" indent="0">
+            <a:lvl3pPr marL="633954" indent="0">
               <a:buNone/>
-              <a:defRPr sz="1200" b="1"/>
+              <a:defRPr sz="1248" b="1"/>
             </a:lvl3pPr>
-            <a:lvl4pPr marL="914446" indent="0">
+            <a:lvl4pPr marL="950930" indent="0">
               <a:buNone/>
-              <a:defRPr sz="1067" b="1"/>
+              <a:defRPr sz="1109" b="1"/>
             </a:lvl4pPr>
-            <a:lvl5pPr marL="1219261" indent="0">
+            <a:lvl5pPr marL="1267907" indent="0">
               <a:buNone/>
-              <a:defRPr sz="1067" b="1"/>
+              <a:defRPr sz="1109" b="1"/>
             </a:lvl5pPr>
-            <a:lvl6pPr marL="1524076" indent="0">
+            <a:lvl6pPr marL="1584884" indent="0">
               <a:buNone/>
-              <a:defRPr sz="1067" b="1"/>
+              <a:defRPr sz="1109" b="1"/>
             </a:lvl6pPr>
-            <a:lvl7pPr marL="1828891" indent="0">
+            <a:lvl7pPr marL="1901861" indent="0">
               <a:buNone/>
-              <a:defRPr sz="1067" b="1"/>
+              <a:defRPr sz="1109" b="1"/>
             </a:lvl7pPr>
-            <a:lvl8pPr marL="2133707" indent="0">
+            <a:lvl8pPr marL="2218837" indent="0">
               <a:buNone/>
-              <a:defRPr sz="1067" b="1"/>
+              <a:defRPr sz="1109" b="1"/>
             </a:lvl8pPr>
-            <a:lvl9pPr marL="2438522" indent="0">
+            <a:lvl9pPr marL="2535814" indent="0">
               <a:buNone/>
-              <a:defRPr sz="1067" b="1"/>
+              <a:defRPr sz="1109" b="1"/>
             </a:lvl9pPr>
           </a:lstStyle>
           <a:p>
@@ -1424,8 +1865,8 @@
         </p:nvSpPr>
         <p:spPr>
           <a:xfrm>
-            <a:off x="850286" y="1670050"/>
-            <a:ext cx="5222259" cy="2456392"/>
+            <a:off x="850286" y="1736736"/>
+            <a:ext cx="5222259" cy="2554477"/>
           </a:xfrm>
         </p:spPr>
         <p:txBody>
@@ -1481,8 +1922,8 @@
         </p:nvSpPr>
         <p:spPr>
           <a:xfrm>
-            <a:off x="6249352" y="1120775"/>
-            <a:ext cx="5247978" cy="549275"/>
+            <a:off x="6249352" y="1165528"/>
+            <a:ext cx="5247978" cy="571208"/>
           </a:xfrm>
         </p:spPr>
         <p:txBody>
@@ -1490,39 +1931,39 @@
           <a:lstStyle>
             <a:lvl1pPr marL="0" indent="0">
               <a:buNone/>
-              <a:defRPr sz="1600" b="1"/>
+              <a:defRPr sz="1664" b="1"/>
             </a:lvl1pPr>
-            <a:lvl2pPr marL="304815" indent="0">
+            <a:lvl2pPr marL="316977" indent="0">
               <a:buNone/>
-              <a:defRPr sz="1333" b="1"/>
+              <a:defRPr sz="1387" b="1"/>
             </a:lvl2pPr>
-            <a:lvl3pPr marL="609630" indent="0">
+            <a:lvl3pPr marL="633954" indent="0">
               <a:buNone/>
-              <a:defRPr sz="1200" b="1"/>
+              <a:defRPr sz="1248" b="1"/>
             </a:lvl3pPr>
-            <a:lvl4pPr marL="914446" indent="0">
+            <a:lvl4pPr marL="950930" indent="0">
               <a:buNone/>
-              <a:defRPr sz="1067" b="1"/>
+              <a:defRPr sz="1109" b="1"/>
             </a:lvl4pPr>
-            <a:lvl5pPr marL="1219261" indent="0">
+            <a:lvl5pPr marL="1267907" indent="0">
               <a:buNone/>
-              <a:defRPr sz="1067" b="1"/>
+              <a:defRPr sz="1109" b="1"/>
             </a:lvl5pPr>
-            <a:lvl6pPr marL="1524076" indent="0">
+            <a:lvl6pPr marL="1584884" indent="0">
               <a:buNone/>
-              <a:defRPr sz="1067" b="1"/>
+              <a:defRPr sz="1109" b="1"/>
             </a:lvl6pPr>
-            <a:lvl7pPr marL="1828891" indent="0">
+            <a:lvl7pPr marL="1901861" indent="0">
               <a:buNone/>
-              <a:defRPr sz="1067" b="1"/>
+              <a:defRPr sz="1109" b="1"/>
             </a:lvl7pPr>
-            <a:lvl8pPr marL="2133707" indent="0">
+            <a:lvl8pPr marL="2218837" indent="0">
               <a:buNone/>
-              <a:defRPr sz="1067" b="1"/>
+              <a:defRPr sz="1109" b="1"/>
             </a:lvl8pPr>
-            <a:lvl9pPr marL="2438522" indent="0">
+            <a:lvl9pPr marL="2535814" indent="0">
               <a:buNone/>
-              <a:defRPr sz="1067" b="1"/>
+              <a:defRPr sz="1109" b="1"/>
             </a:lvl9pPr>
           </a:lstStyle>
           <a:p>
@@ -1546,8 +1987,8 @@
         </p:nvSpPr>
         <p:spPr>
           <a:xfrm>
-            <a:off x="6249352" y="1670050"/>
-            <a:ext cx="5247978" cy="2456392"/>
+            <a:off x="6249352" y="1736736"/>
+            <a:ext cx="5247978" cy="2554477"/>
           </a:xfrm>
         </p:spPr>
         <p:txBody>
@@ -1608,7 +2049,7 @@
           <a:p>
             <a:fld id="{DD6D9246-4FED-8E4D-BC9B-CDD794F2A5B7}" type="datetimeFigureOut">
               <a:rPr lang="en-US" smtClean="0"/>
-              <a:t>2/11/22</a:t>
+              <a:t>6/23/22</a:t>
             </a:fld>
             <a:endParaRPr lang="en-US"/>
           </a:p>
@@ -1659,7 +2100,7 @@
     </p:spTree>
     <p:extLst>
       <p:ext uri="{BB962C8B-B14F-4D97-AF65-F5344CB8AC3E}">
-        <p14:creationId xmlns:p14="http://schemas.microsoft.com/office/powerpoint/2010/main" val="2882431151"/>
+        <p14:creationId xmlns:p14="http://schemas.microsoft.com/office/powerpoint/2010/main" val="2166530467"/>
       </p:ext>
     </p:extLst>
   </p:cSld>
@@ -1726,7 +2167,7 @@
           <a:p>
             <a:fld id="{DD6D9246-4FED-8E4D-BC9B-CDD794F2A5B7}" type="datetimeFigureOut">
               <a:rPr lang="en-US" smtClean="0"/>
-              <a:t>2/11/22</a:t>
+              <a:t>6/23/22</a:t>
             </a:fld>
             <a:endParaRPr lang="en-US"/>
           </a:p>
@@ -1777,7 +2218,7 @@
     </p:spTree>
     <p:extLst>
       <p:ext uri="{BB962C8B-B14F-4D97-AF65-F5344CB8AC3E}">
-        <p14:creationId xmlns:p14="http://schemas.microsoft.com/office/powerpoint/2010/main" val="125232349"/>
+        <p14:creationId xmlns:p14="http://schemas.microsoft.com/office/powerpoint/2010/main" val="1015467324"/>
       </p:ext>
     </p:extLst>
   </p:cSld>
@@ -1821,7 +2262,7 @@
           <a:p>
             <a:fld id="{DD6D9246-4FED-8E4D-BC9B-CDD794F2A5B7}" type="datetimeFigureOut">
               <a:rPr lang="en-US" smtClean="0"/>
-              <a:t>2/11/22</a:t>
+              <a:t>6/23/22</a:t>
             </a:fld>
             <a:endParaRPr lang="en-US"/>
           </a:p>
@@ -1872,7 +2313,7 @@
     </p:spTree>
     <p:extLst>
       <p:ext uri="{BB962C8B-B14F-4D97-AF65-F5344CB8AC3E}">
-        <p14:creationId xmlns:p14="http://schemas.microsoft.com/office/powerpoint/2010/main" val="2993598731"/>
+        <p14:creationId xmlns:p14="http://schemas.microsoft.com/office/powerpoint/2010/main" val="3607978305"/>
       </p:ext>
     </p:extLst>
   </p:cSld>
@@ -1911,15 +2352,15 @@
         </p:nvSpPr>
         <p:spPr>
           <a:xfrm>
-            <a:off x="850286" y="304800"/>
-            <a:ext cx="3981390" cy="1066800"/>
+            <a:off x="850286" y="316971"/>
+            <a:ext cx="3981390" cy="1109398"/>
           </a:xfrm>
         </p:spPr>
         <p:txBody>
           <a:bodyPr anchor="b"/>
           <a:lstStyle>
             <a:lvl1pPr>
-              <a:defRPr sz="2133"/>
+              <a:defRPr sz="2219"/>
             </a:lvl1pPr>
           </a:lstStyle>
           <a:p>
@@ -1943,39 +2384,39 @@
         </p:nvSpPr>
         <p:spPr>
           <a:xfrm>
-            <a:off x="5247978" y="658284"/>
-            <a:ext cx="6249353" cy="3249083"/>
+            <a:off x="5247978" y="684570"/>
+            <a:ext cx="6249353" cy="3378821"/>
           </a:xfrm>
         </p:spPr>
         <p:txBody>
           <a:bodyPr/>
           <a:lstStyle>
             <a:lvl1pPr>
-              <a:defRPr sz="2133"/>
+              <a:defRPr sz="2219"/>
             </a:lvl1pPr>
             <a:lvl2pPr>
-              <a:defRPr sz="1867"/>
+              <a:defRPr sz="1941"/>
             </a:lvl2pPr>
             <a:lvl3pPr>
-              <a:defRPr sz="1600"/>
+              <a:defRPr sz="1664"/>
             </a:lvl3pPr>
             <a:lvl4pPr>
-              <a:defRPr sz="1333"/>
+              <a:defRPr sz="1387"/>
             </a:lvl4pPr>
             <a:lvl5pPr>
-              <a:defRPr sz="1333"/>
+              <a:defRPr sz="1387"/>
             </a:lvl5pPr>
             <a:lvl6pPr>
-              <a:defRPr sz="1333"/>
+              <a:defRPr sz="1387"/>
             </a:lvl6pPr>
             <a:lvl7pPr>
-              <a:defRPr sz="1333"/>
+              <a:defRPr sz="1387"/>
             </a:lvl7pPr>
             <a:lvl8pPr>
-              <a:defRPr sz="1333"/>
+              <a:defRPr sz="1387"/>
             </a:lvl8pPr>
             <a:lvl9pPr>
-              <a:defRPr sz="1333"/>
+              <a:defRPr sz="1387"/>
             </a:lvl9pPr>
           </a:lstStyle>
           <a:p>
@@ -2028,8 +2469,8 @@
         </p:nvSpPr>
         <p:spPr>
           <a:xfrm>
-            <a:off x="850286" y="1371600"/>
-            <a:ext cx="3981390" cy="2541059"/>
+            <a:off x="850286" y="1426369"/>
+            <a:ext cx="3981390" cy="2642525"/>
           </a:xfrm>
         </p:spPr>
         <p:txBody>
@@ -2037,39 +2478,39 @@
           <a:lstStyle>
             <a:lvl1pPr marL="0" indent="0">
               <a:buNone/>
-              <a:defRPr sz="1067"/>
+              <a:defRPr sz="1109"/>
             </a:lvl1pPr>
-            <a:lvl2pPr marL="304815" indent="0">
+            <a:lvl2pPr marL="316977" indent="0">
               <a:buNone/>
-              <a:defRPr sz="933"/>
+              <a:defRPr sz="971"/>
             </a:lvl2pPr>
-            <a:lvl3pPr marL="609630" indent="0">
+            <a:lvl3pPr marL="633954" indent="0">
               <a:buNone/>
-              <a:defRPr sz="800"/>
+              <a:defRPr sz="832"/>
             </a:lvl3pPr>
-            <a:lvl4pPr marL="914446" indent="0">
+            <a:lvl4pPr marL="950930" indent="0">
               <a:buNone/>
-              <a:defRPr sz="667"/>
+              <a:defRPr sz="693"/>
             </a:lvl4pPr>
-            <a:lvl5pPr marL="1219261" indent="0">
+            <a:lvl5pPr marL="1267907" indent="0">
               <a:buNone/>
-              <a:defRPr sz="667"/>
+              <a:defRPr sz="693"/>
             </a:lvl5pPr>
-            <a:lvl6pPr marL="1524076" indent="0">
+            <a:lvl6pPr marL="1584884" indent="0">
               <a:buNone/>
-              <a:defRPr sz="667"/>
+              <a:defRPr sz="693"/>
             </a:lvl6pPr>
-            <a:lvl7pPr marL="1828891" indent="0">
+            <a:lvl7pPr marL="1901861" indent="0">
               <a:buNone/>
-              <a:defRPr sz="667"/>
+              <a:defRPr sz="693"/>
             </a:lvl7pPr>
-            <a:lvl8pPr marL="2133707" indent="0">
+            <a:lvl8pPr marL="2218837" indent="0">
               <a:buNone/>
-              <a:defRPr sz="667"/>
+              <a:defRPr sz="693"/>
             </a:lvl8pPr>
-            <a:lvl9pPr marL="2438522" indent="0">
+            <a:lvl9pPr marL="2535814" indent="0">
               <a:buNone/>
-              <a:defRPr sz="667"/>
+              <a:defRPr sz="693"/>
             </a:lvl9pPr>
           </a:lstStyle>
           <a:p>
@@ -2098,7 +2539,7 @@
           <a:p>
             <a:fld id="{DD6D9246-4FED-8E4D-BC9B-CDD794F2A5B7}" type="datetimeFigureOut">
               <a:rPr lang="en-US" smtClean="0"/>
-              <a:t>2/11/22</a:t>
+              <a:t>6/23/22</a:t>
             </a:fld>
             <a:endParaRPr lang="en-US"/>
           </a:p>
@@ -2149,7 +2590,7 @@
     </p:spTree>
     <p:extLst>
       <p:ext uri="{BB962C8B-B14F-4D97-AF65-F5344CB8AC3E}">
-        <p14:creationId xmlns:p14="http://schemas.microsoft.com/office/powerpoint/2010/main" val="1996657658"/>
+        <p14:creationId xmlns:p14="http://schemas.microsoft.com/office/powerpoint/2010/main" val="2191581925"/>
       </p:ext>
     </p:extLst>
   </p:cSld>
@@ -2188,15 +2629,15 @@
         </p:nvSpPr>
         <p:spPr>
           <a:xfrm>
-            <a:off x="850286" y="304800"/>
-            <a:ext cx="3981390" cy="1066800"/>
+            <a:off x="850286" y="316971"/>
+            <a:ext cx="3981390" cy="1109398"/>
           </a:xfrm>
         </p:spPr>
         <p:txBody>
           <a:bodyPr anchor="b"/>
           <a:lstStyle>
             <a:lvl1pPr>
-              <a:defRPr sz="2133"/>
+              <a:defRPr sz="2219"/>
             </a:lvl1pPr>
           </a:lstStyle>
           <a:p>
@@ -2220,8 +2661,8 @@
         </p:nvSpPr>
         <p:spPr>
           <a:xfrm>
-            <a:off x="5247978" y="658284"/>
-            <a:ext cx="6249353" cy="3249083"/>
+            <a:off x="5247978" y="684570"/>
+            <a:ext cx="6249353" cy="3378821"/>
           </a:xfrm>
         </p:spPr>
         <p:txBody>
@@ -2229,39 +2670,39 @@
           <a:lstStyle>
             <a:lvl1pPr marL="0" indent="0">
               <a:buNone/>
-              <a:defRPr sz="2133"/>
+              <a:defRPr sz="2219"/>
             </a:lvl1pPr>
-            <a:lvl2pPr marL="304815" indent="0">
+            <a:lvl2pPr marL="316977" indent="0">
               <a:buNone/>
-              <a:defRPr sz="1867"/>
+              <a:defRPr sz="1941"/>
             </a:lvl2pPr>
-            <a:lvl3pPr marL="609630" indent="0">
+            <a:lvl3pPr marL="633954" indent="0">
               <a:buNone/>
-              <a:defRPr sz="1600"/>
+              <a:defRPr sz="1664"/>
             </a:lvl3pPr>
-            <a:lvl4pPr marL="914446" indent="0">
+            <a:lvl4pPr marL="950930" indent="0">
               <a:buNone/>
-              <a:defRPr sz="1333"/>
+              <a:defRPr sz="1387"/>
             </a:lvl4pPr>
-            <a:lvl5pPr marL="1219261" indent="0">
+            <a:lvl5pPr marL="1267907" indent="0">
               <a:buNone/>
-              <a:defRPr sz="1333"/>
+              <a:defRPr sz="1387"/>
             </a:lvl5pPr>
-            <a:lvl6pPr marL="1524076" indent="0">
+            <a:lvl6pPr marL="1584884" indent="0">
               <a:buNone/>
-              <a:defRPr sz="1333"/>
+              <a:defRPr sz="1387"/>
             </a:lvl6pPr>
-            <a:lvl7pPr marL="1828891" indent="0">
+            <a:lvl7pPr marL="1901861" indent="0">
               <a:buNone/>
-              <a:defRPr sz="1333"/>
+              <a:defRPr sz="1387"/>
             </a:lvl7pPr>
-            <a:lvl8pPr marL="2133707" indent="0">
+            <a:lvl8pPr marL="2218837" indent="0">
               <a:buNone/>
-              <a:defRPr sz="1333"/>
+              <a:defRPr sz="1387"/>
             </a:lvl8pPr>
-            <a:lvl9pPr marL="2438522" indent="0">
+            <a:lvl9pPr marL="2535814" indent="0">
               <a:buNone/>
-              <a:defRPr sz="1333"/>
+              <a:defRPr sz="1387"/>
             </a:lvl9pPr>
           </a:lstStyle>
           <a:p>
@@ -2285,8 +2726,8 @@
         </p:nvSpPr>
         <p:spPr>
           <a:xfrm>
-            <a:off x="850286" y="1371600"/>
-            <a:ext cx="3981390" cy="2541059"/>
+            <a:off x="850286" y="1426369"/>
+            <a:ext cx="3981390" cy="2642525"/>
           </a:xfrm>
         </p:spPr>
         <p:txBody>
@@ -2294,39 +2735,39 @@
           <a:lstStyle>
             <a:lvl1pPr marL="0" indent="0">
               <a:buNone/>
-              <a:defRPr sz="1067"/>
+              <a:defRPr sz="1109"/>
             </a:lvl1pPr>
-            <a:lvl2pPr marL="304815" indent="0">
+            <a:lvl2pPr marL="316977" indent="0">
               <a:buNone/>
-              <a:defRPr sz="933"/>
+              <a:defRPr sz="971"/>
             </a:lvl2pPr>
-            <a:lvl3pPr marL="609630" indent="0">
+            <a:lvl3pPr marL="633954" indent="0">
               <a:buNone/>
-              <a:defRPr sz="800"/>
+              <a:defRPr sz="832"/>
             </a:lvl3pPr>
-            <a:lvl4pPr marL="914446" indent="0">
+            <a:lvl4pPr marL="950930" indent="0">
               <a:buNone/>
-              <a:defRPr sz="667"/>
+              <a:defRPr sz="693"/>
             </a:lvl4pPr>
-            <a:lvl5pPr marL="1219261" indent="0">
+            <a:lvl5pPr marL="1267907" indent="0">
               <a:buNone/>
-              <a:defRPr sz="667"/>
+              <a:defRPr sz="693"/>
             </a:lvl5pPr>
-            <a:lvl6pPr marL="1524076" indent="0">
+            <a:lvl6pPr marL="1584884" indent="0">
               <a:buNone/>
-              <a:defRPr sz="667"/>
+              <a:defRPr sz="693"/>
             </a:lvl6pPr>
-            <a:lvl7pPr marL="1828891" indent="0">
+            <a:lvl7pPr marL="1901861" indent="0">
               <a:buNone/>
-              <a:defRPr sz="667"/>
+              <a:defRPr sz="693"/>
             </a:lvl7pPr>
-            <a:lvl8pPr marL="2133707" indent="0">
+            <a:lvl8pPr marL="2218837" indent="0">
               <a:buNone/>
-              <a:defRPr sz="667"/>
+              <a:defRPr sz="693"/>
             </a:lvl8pPr>
-            <a:lvl9pPr marL="2438522" indent="0">
+            <a:lvl9pPr marL="2535814" indent="0">
               <a:buNone/>
-              <a:defRPr sz="667"/>
+              <a:defRPr sz="693"/>
             </a:lvl9pPr>
           </a:lstStyle>
           <a:p>
@@ -2355,7 +2796,7 @@
           <a:p>
             <a:fld id="{DD6D9246-4FED-8E4D-BC9B-CDD794F2A5B7}" type="datetimeFigureOut">
               <a:rPr lang="en-US" smtClean="0"/>
-              <a:t>2/11/22</a:t>
+              <a:t>6/23/22</a:t>
             </a:fld>
             <a:endParaRPr lang="en-US"/>
           </a:p>
@@ -2406,7 +2847,7 @@
     </p:spTree>
     <p:extLst>
       <p:ext uri="{BB962C8B-B14F-4D97-AF65-F5344CB8AC3E}">
-        <p14:creationId xmlns:p14="http://schemas.microsoft.com/office/powerpoint/2010/main" val="1192855786"/>
+        <p14:creationId xmlns:p14="http://schemas.microsoft.com/office/powerpoint/2010/main" val="3935618335"/>
       </p:ext>
     </p:extLst>
   </p:cSld>
@@ -2450,8 +2891,8 @@
         </p:nvSpPr>
         <p:spPr>
           <a:xfrm>
-            <a:off x="848678" y="243417"/>
-            <a:ext cx="10647045" cy="883709"/>
+            <a:off x="848678" y="253137"/>
+            <a:ext cx="10647045" cy="918996"/>
           </a:xfrm>
           <a:prstGeom prst="rect">
             <a:avLst/>
@@ -2483,8 +2924,8 @@
         </p:nvSpPr>
         <p:spPr>
           <a:xfrm>
-            <a:off x="848678" y="1217083"/>
-            <a:ext cx="10647045" cy="2900892"/>
+            <a:off x="848678" y="1265682"/>
+            <a:ext cx="10647045" cy="3016727"/>
           </a:xfrm>
           <a:prstGeom prst="rect">
             <a:avLst/>
@@ -2545,8 +2986,8 @@
         </p:nvSpPr>
         <p:spPr>
           <a:xfrm>
-            <a:off x="848678" y="4237567"/>
-            <a:ext cx="2777490" cy="243417"/>
+            <a:off x="848678" y="4406776"/>
+            <a:ext cx="2777490" cy="253136"/>
           </a:xfrm>
           <a:prstGeom prst="rect">
             <a:avLst/>
@@ -2556,7 +2997,7 @@
           <a:bodyPr vert="horz" lIns="91440" tIns="45720" rIns="91440" bIns="45720" rtlCol="0" anchor="ctr"/>
           <a:lstStyle>
             <a:lvl1pPr algn="l">
-              <a:defRPr sz="800">
+              <a:defRPr sz="832">
                 <a:solidFill>
                   <a:schemeClr val="tx1">
                     <a:tint val="75000"/>
@@ -2568,7 +3009,7 @@
           <a:p>
             <a:fld id="{DD6D9246-4FED-8E4D-BC9B-CDD794F2A5B7}" type="datetimeFigureOut">
               <a:rPr lang="en-US" smtClean="0"/>
-              <a:t>2/11/22</a:t>
+              <a:t>6/23/22</a:t>
             </a:fld>
             <a:endParaRPr lang="en-US"/>
           </a:p>
@@ -2586,8 +3027,8 @@
         </p:nvSpPr>
         <p:spPr>
           <a:xfrm>
-            <a:off x="4089083" y="4237567"/>
-            <a:ext cx="4166235" cy="243417"/>
+            <a:off x="4089083" y="4406776"/>
+            <a:ext cx="4166235" cy="253136"/>
           </a:xfrm>
           <a:prstGeom prst="rect">
             <a:avLst/>
@@ -2597,7 +3038,7 @@
           <a:bodyPr vert="horz" lIns="91440" tIns="45720" rIns="91440" bIns="45720" rtlCol="0" anchor="ctr"/>
           <a:lstStyle>
             <a:lvl1pPr algn="ctr">
-              <a:defRPr sz="800">
+              <a:defRPr sz="832">
                 <a:solidFill>
                   <a:schemeClr val="tx1">
                     <a:tint val="75000"/>
@@ -2623,8 +3064,8 @@
         </p:nvSpPr>
         <p:spPr>
           <a:xfrm>
-            <a:off x="8718233" y="4237567"/>
-            <a:ext cx="2777490" cy="243417"/>
+            <a:off x="8718233" y="4406776"/>
+            <a:ext cx="2777490" cy="253136"/>
           </a:xfrm>
           <a:prstGeom prst="rect">
             <a:avLst/>
@@ -2634,7 +3075,7 @@
           <a:bodyPr vert="horz" lIns="91440" tIns="45720" rIns="91440" bIns="45720" rtlCol="0" anchor="ctr"/>
           <a:lstStyle>
             <a:lvl1pPr algn="r">
-              <a:defRPr sz="800">
+              <a:defRPr sz="832">
                 <a:solidFill>
                   <a:schemeClr val="tx1">
                     <a:tint val="75000"/>
@@ -2655,27 +3096,27 @@
     </p:spTree>
     <p:extLst>
       <p:ext uri="{BB962C8B-B14F-4D97-AF65-F5344CB8AC3E}">
-        <p14:creationId xmlns:p14="http://schemas.microsoft.com/office/powerpoint/2010/main" val="3321046470"/>
+        <p14:creationId xmlns:p14="http://schemas.microsoft.com/office/powerpoint/2010/main" val="2683191803"/>
       </p:ext>
     </p:extLst>
   </p:cSld>
   <p:clrMap bg1="lt1" tx1="dk1" bg2="lt2" tx2="dk2" accent1="accent1" accent2="accent2" accent3="accent3" accent4="accent4" accent5="accent5" accent6="accent6" hlink="hlink" folHlink="folHlink"/>
   <p:sldLayoutIdLst>
-    <p:sldLayoutId id="2147483709" r:id="rId1"/>
-    <p:sldLayoutId id="2147483710" r:id="rId2"/>
-    <p:sldLayoutId id="2147483711" r:id="rId3"/>
-    <p:sldLayoutId id="2147483712" r:id="rId4"/>
-    <p:sldLayoutId id="2147483713" r:id="rId5"/>
-    <p:sldLayoutId id="2147483714" r:id="rId6"/>
-    <p:sldLayoutId id="2147483715" r:id="rId7"/>
-    <p:sldLayoutId id="2147483716" r:id="rId8"/>
-    <p:sldLayoutId id="2147483717" r:id="rId9"/>
-    <p:sldLayoutId id="2147483718" r:id="rId10"/>
-    <p:sldLayoutId id="2147483719" r:id="rId11"/>
+    <p:sldLayoutId id="2147483757" r:id="rId1"/>
+    <p:sldLayoutId id="2147483758" r:id="rId2"/>
+    <p:sldLayoutId id="2147483759" r:id="rId3"/>
+    <p:sldLayoutId id="2147483760" r:id="rId4"/>
+    <p:sldLayoutId id="2147483761" r:id="rId5"/>
+    <p:sldLayoutId id="2147483762" r:id="rId6"/>
+    <p:sldLayoutId id="2147483763" r:id="rId7"/>
+    <p:sldLayoutId id="2147483764" r:id="rId8"/>
+    <p:sldLayoutId id="2147483765" r:id="rId9"/>
+    <p:sldLayoutId id="2147483766" r:id="rId10"/>
+    <p:sldLayoutId id="2147483767" r:id="rId11"/>
   </p:sldLayoutIdLst>
   <p:txStyles>
     <p:titleStyle>
-      <a:lvl1pPr algn="l" defTabSz="609630" rtl="0" eaLnBrk="1" latinLnBrk="0" hangingPunct="1">
+      <a:lvl1pPr algn="l" defTabSz="633954" rtl="0" eaLnBrk="1" latinLnBrk="0" hangingPunct="1">
         <a:lnSpc>
           <a:spcPct val="90000"/>
         </a:lnSpc>
@@ -2683,7 +3124,7 @@
           <a:spcPct val="0"/>
         </a:spcBef>
         <a:buNone/>
-        <a:defRPr sz="2933" kern="1200">
+        <a:defRPr sz="3051" kern="1200">
           <a:solidFill>
             <a:schemeClr val="tx1"/>
           </a:solidFill>
@@ -2694,16 +3135,16 @@
       </a:lvl1pPr>
     </p:titleStyle>
     <p:bodyStyle>
-      <a:lvl1pPr marL="152408" indent="-152408" algn="l" defTabSz="609630" rtl="0" eaLnBrk="1" latinLnBrk="0" hangingPunct="1">
+      <a:lvl1pPr marL="158488" indent="-158488" algn="l" defTabSz="633954" rtl="0" eaLnBrk="1" latinLnBrk="0" hangingPunct="1">
         <a:lnSpc>
           <a:spcPct val="90000"/>
         </a:lnSpc>
         <a:spcBef>
-          <a:spcPts val="667"/>
+          <a:spcPts val="693"/>
         </a:spcBef>
         <a:buFont typeface="Arial" panose="020B0604020202020204" pitchFamily="34" charset="0"/>
         <a:buChar char="•"/>
-        <a:defRPr sz="1867" kern="1200">
+        <a:defRPr sz="1941" kern="1200">
           <a:solidFill>
             <a:schemeClr val="tx1"/>
           </a:solidFill>
@@ -2712,16 +3153,16 @@
           <a:cs typeface="+mn-cs"/>
         </a:defRPr>
       </a:lvl1pPr>
-      <a:lvl2pPr marL="457223" indent="-152408" algn="l" defTabSz="609630" rtl="0" eaLnBrk="1" latinLnBrk="0" hangingPunct="1">
+      <a:lvl2pPr marL="475465" indent="-158488" algn="l" defTabSz="633954" rtl="0" eaLnBrk="1" latinLnBrk="0" hangingPunct="1">
         <a:lnSpc>
           <a:spcPct val="90000"/>
         </a:lnSpc>
         <a:spcBef>
-          <a:spcPts val="333"/>
+          <a:spcPts val="347"/>
         </a:spcBef>
         <a:buFont typeface="Arial" panose="020B0604020202020204" pitchFamily="34" charset="0"/>
         <a:buChar char="•"/>
-        <a:defRPr sz="1600" kern="1200">
+        <a:defRPr sz="1664" kern="1200">
           <a:solidFill>
             <a:schemeClr val="tx1"/>
           </a:solidFill>
@@ -2730,16 +3171,16 @@
           <a:cs typeface="+mn-cs"/>
         </a:defRPr>
       </a:lvl2pPr>
-      <a:lvl3pPr marL="762038" indent="-152408" algn="l" defTabSz="609630" rtl="0" eaLnBrk="1" latinLnBrk="0" hangingPunct="1">
+      <a:lvl3pPr marL="792442" indent="-158488" algn="l" defTabSz="633954" rtl="0" eaLnBrk="1" latinLnBrk="0" hangingPunct="1">
         <a:lnSpc>
           <a:spcPct val="90000"/>
         </a:lnSpc>
         <a:spcBef>
-          <a:spcPts val="333"/>
+          <a:spcPts val="347"/>
         </a:spcBef>
         <a:buFont typeface="Arial" panose="020B0604020202020204" pitchFamily="34" charset="0"/>
         <a:buChar char="•"/>
-        <a:defRPr sz="1333" kern="1200">
+        <a:defRPr sz="1387" kern="1200">
           <a:solidFill>
             <a:schemeClr val="tx1"/>
           </a:solidFill>
@@ -2748,16 +3189,16 @@
           <a:cs typeface="+mn-cs"/>
         </a:defRPr>
       </a:lvl3pPr>
-      <a:lvl4pPr marL="1066853" indent="-152408" algn="l" defTabSz="609630" rtl="0" eaLnBrk="1" latinLnBrk="0" hangingPunct="1">
+      <a:lvl4pPr marL="1109419" indent="-158488" algn="l" defTabSz="633954" rtl="0" eaLnBrk="1" latinLnBrk="0" hangingPunct="1">
         <a:lnSpc>
           <a:spcPct val="90000"/>
         </a:lnSpc>
         <a:spcBef>
-          <a:spcPts val="333"/>
+          <a:spcPts val="347"/>
         </a:spcBef>
         <a:buFont typeface="Arial" panose="020B0604020202020204" pitchFamily="34" charset="0"/>
         <a:buChar char="•"/>
-        <a:defRPr sz="1200" kern="1200">
+        <a:defRPr sz="1248" kern="1200">
           <a:solidFill>
             <a:schemeClr val="tx1"/>
           </a:solidFill>
@@ -2766,16 +3207,16 @@
           <a:cs typeface="+mn-cs"/>
         </a:defRPr>
       </a:lvl4pPr>
-      <a:lvl5pPr marL="1371669" indent="-152408" algn="l" defTabSz="609630" rtl="0" eaLnBrk="1" latinLnBrk="0" hangingPunct="1">
+      <a:lvl5pPr marL="1426395" indent="-158488" algn="l" defTabSz="633954" rtl="0" eaLnBrk="1" latinLnBrk="0" hangingPunct="1">
         <a:lnSpc>
           <a:spcPct val="90000"/>
         </a:lnSpc>
         <a:spcBef>
-          <a:spcPts val="333"/>
+          <a:spcPts val="347"/>
         </a:spcBef>
         <a:buFont typeface="Arial" panose="020B0604020202020204" pitchFamily="34" charset="0"/>
         <a:buChar char="•"/>
-        <a:defRPr sz="1200" kern="1200">
+        <a:defRPr sz="1248" kern="1200">
           <a:solidFill>
             <a:schemeClr val="tx1"/>
           </a:solidFill>
@@ -2784,16 +3225,16 @@
           <a:cs typeface="+mn-cs"/>
         </a:defRPr>
       </a:lvl5pPr>
-      <a:lvl6pPr marL="1676484" indent="-152408" algn="l" defTabSz="609630" rtl="0" eaLnBrk="1" latinLnBrk="0" hangingPunct="1">
+      <a:lvl6pPr marL="1743372" indent="-158488" algn="l" defTabSz="633954" rtl="0" eaLnBrk="1" latinLnBrk="0" hangingPunct="1">
         <a:lnSpc>
           <a:spcPct val="90000"/>
         </a:lnSpc>
         <a:spcBef>
-          <a:spcPts val="333"/>
+          <a:spcPts val="347"/>
         </a:spcBef>
         <a:buFont typeface="Arial" panose="020B0604020202020204" pitchFamily="34" charset="0"/>
         <a:buChar char="•"/>
-        <a:defRPr sz="1200" kern="1200">
+        <a:defRPr sz="1248" kern="1200">
           <a:solidFill>
             <a:schemeClr val="tx1"/>
           </a:solidFill>
@@ -2802,16 +3243,16 @@
           <a:cs typeface="+mn-cs"/>
         </a:defRPr>
       </a:lvl6pPr>
-      <a:lvl7pPr marL="1981299" indent="-152408" algn="l" defTabSz="609630" rtl="0" eaLnBrk="1" latinLnBrk="0" hangingPunct="1">
+      <a:lvl7pPr marL="2060349" indent="-158488" algn="l" defTabSz="633954" rtl="0" eaLnBrk="1" latinLnBrk="0" hangingPunct="1">
         <a:lnSpc>
           <a:spcPct val="90000"/>
         </a:lnSpc>
         <a:spcBef>
-          <a:spcPts val="333"/>
+          <a:spcPts val="347"/>
         </a:spcBef>
         <a:buFont typeface="Arial" panose="020B0604020202020204" pitchFamily="34" charset="0"/>
         <a:buChar char="•"/>
-        <a:defRPr sz="1200" kern="1200">
+        <a:defRPr sz="1248" kern="1200">
           <a:solidFill>
             <a:schemeClr val="tx1"/>
           </a:solidFill>
@@ -2820,16 +3261,16 @@
           <a:cs typeface="+mn-cs"/>
         </a:defRPr>
       </a:lvl7pPr>
-      <a:lvl8pPr marL="2286114" indent="-152408" algn="l" defTabSz="609630" rtl="0" eaLnBrk="1" latinLnBrk="0" hangingPunct="1">
+      <a:lvl8pPr marL="2377326" indent="-158488" algn="l" defTabSz="633954" rtl="0" eaLnBrk="1" latinLnBrk="0" hangingPunct="1">
         <a:lnSpc>
           <a:spcPct val="90000"/>
         </a:lnSpc>
         <a:spcBef>
-          <a:spcPts val="333"/>
+          <a:spcPts val="347"/>
         </a:spcBef>
         <a:buFont typeface="Arial" panose="020B0604020202020204" pitchFamily="34" charset="0"/>
         <a:buChar char="•"/>
-        <a:defRPr sz="1200" kern="1200">
+        <a:defRPr sz="1248" kern="1200">
           <a:solidFill>
             <a:schemeClr val="tx1"/>
           </a:solidFill>
@@ -2838,16 +3279,16 @@
           <a:cs typeface="+mn-cs"/>
         </a:defRPr>
       </a:lvl8pPr>
-      <a:lvl9pPr marL="2590930" indent="-152408" algn="l" defTabSz="609630" rtl="0" eaLnBrk="1" latinLnBrk="0" hangingPunct="1">
+      <a:lvl9pPr marL="2694302" indent="-158488" algn="l" defTabSz="633954" rtl="0" eaLnBrk="1" latinLnBrk="0" hangingPunct="1">
         <a:lnSpc>
           <a:spcPct val="90000"/>
         </a:lnSpc>
         <a:spcBef>
-          <a:spcPts val="333"/>
+          <a:spcPts val="347"/>
         </a:spcBef>
         <a:buFont typeface="Arial" panose="020B0604020202020204" pitchFamily="34" charset="0"/>
         <a:buChar char="•"/>
-        <a:defRPr sz="1200" kern="1200">
+        <a:defRPr sz="1248" kern="1200">
           <a:solidFill>
             <a:schemeClr val="tx1"/>
           </a:solidFill>
@@ -2861,8 +3302,8 @@
       <a:defPPr>
         <a:defRPr lang="en-US"/>
       </a:defPPr>
-      <a:lvl1pPr marL="0" algn="l" defTabSz="609630" rtl="0" eaLnBrk="1" latinLnBrk="0" hangingPunct="1">
-        <a:defRPr sz="1200" kern="1200">
+      <a:lvl1pPr marL="0" algn="l" defTabSz="633954" rtl="0" eaLnBrk="1" latinLnBrk="0" hangingPunct="1">
+        <a:defRPr sz="1248" kern="1200">
           <a:solidFill>
             <a:schemeClr val="tx1"/>
           </a:solidFill>
@@ -2871,8 +3312,8 @@
           <a:cs typeface="+mn-cs"/>
         </a:defRPr>
       </a:lvl1pPr>
-      <a:lvl2pPr marL="304815" algn="l" defTabSz="609630" rtl="0" eaLnBrk="1" latinLnBrk="0" hangingPunct="1">
-        <a:defRPr sz="1200" kern="1200">
+      <a:lvl2pPr marL="316977" algn="l" defTabSz="633954" rtl="0" eaLnBrk="1" latinLnBrk="0" hangingPunct="1">
+        <a:defRPr sz="1248" kern="1200">
           <a:solidFill>
             <a:schemeClr val="tx1"/>
           </a:solidFill>
@@ -2881,8 +3322,8 @@
           <a:cs typeface="+mn-cs"/>
         </a:defRPr>
       </a:lvl2pPr>
-      <a:lvl3pPr marL="609630" algn="l" defTabSz="609630" rtl="0" eaLnBrk="1" latinLnBrk="0" hangingPunct="1">
-        <a:defRPr sz="1200" kern="1200">
+      <a:lvl3pPr marL="633954" algn="l" defTabSz="633954" rtl="0" eaLnBrk="1" latinLnBrk="0" hangingPunct="1">
+        <a:defRPr sz="1248" kern="1200">
           <a:solidFill>
             <a:schemeClr val="tx1"/>
           </a:solidFill>
@@ -2891,8 +3332,8 @@
           <a:cs typeface="+mn-cs"/>
         </a:defRPr>
       </a:lvl3pPr>
-      <a:lvl4pPr marL="914446" algn="l" defTabSz="609630" rtl="0" eaLnBrk="1" latinLnBrk="0" hangingPunct="1">
-        <a:defRPr sz="1200" kern="1200">
+      <a:lvl4pPr marL="950930" algn="l" defTabSz="633954" rtl="0" eaLnBrk="1" latinLnBrk="0" hangingPunct="1">
+        <a:defRPr sz="1248" kern="1200">
           <a:solidFill>
             <a:schemeClr val="tx1"/>
           </a:solidFill>
@@ -2901,8 +3342,8 @@
           <a:cs typeface="+mn-cs"/>
         </a:defRPr>
       </a:lvl4pPr>
-      <a:lvl5pPr marL="1219261" algn="l" defTabSz="609630" rtl="0" eaLnBrk="1" latinLnBrk="0" hangingPunct="1">
-        <a:defRPr sz="1200" kern="1200">
+      <a:lvl5pPr marL="1267907" algn="l" defTabSz="633954" rtl="0" eaLnBrk="1" latinLnBrk="0" hangingPunct="1">
+        <a:defRPr sz="1248" kern="1200">
           <a:solidFill>
             <a:schemeClr val="tx1"/>
           </a:solidFill>
@@ -2911,8 +3352,8 @@
           <a:cs typeface="+mn-cs"/>
         </a:defRPr>
       </a:lvl5pPr>
-      <a:lvl6pPr marL="1524076" algn="l" defTabSz="609630" rtl="0" eaLnBrk="1" latinLnBrk="0" hangingPunct="1">
-        <a:defRPr sz="1200" kern="1200">
+      <a:lvl6pPr marL="1584884" algn="l" defTabSz="633954" rtl="0" eaLnBrk="1" latinLnBrk="0" hangingPunct="1">
+        <a:defRPr sz="1248" kern="1200">
           <a:solidFill>
             <a:schemeClr val="tx1"/>
           </a:solidFill>
@@ -2921,8 +3362,8 @@
           <a:cs typeface="+mn-cs"/>
         </a:defRPr>
       </a:lvl6pPr>
-      <a:lvl7pPr marL="1828891" algn="l" defTabSz="609630" rtl="0" eaLnBrk="1" latinLnBrk="0" hangingPunct="1">
-        <a:defRPr sz="1200" kern="1200">
+      <a:lvl7pPr marL="1901861" algn="l" defTabSz="633954" rtl="0" eaLnBrk="1" latinLnBrk="0" hangingPunct="1">
+        <a:defRPr sz="1248" kern="1200">
           <a:solidFill>
             <a:schemeClr val="tx1"/>
           </a:solidFill>
@@ -2931,8 +3372,8 @@
           <a:cs typeface="+mn-cs"/>
         </a:defRPr>
       </a:lvl7pPr>
-      <a:lvl8pPr marL="2133707" algn="l" defTabSz="609630" rtl="0" eaLnBrk="1" latinLnBrk="0" hangingPunct="1">
-        <a:defRPr sz="1200" kern="1200">
+      <a:lvl8pPr marL="2218837" algn="l" defTabSz="633954" rtl="0" eaLnBrk="1" latinLnBrk="0" hangingPunct="1">
+        <a:defRPr sz="1248" kern="1200">
           <a:solidFill>
             <a:schemeClr val="tx1"/>
           </a:solidFill>
@@ -2941,8 +3382,8 @@
           <a:cs typeface="+mn-cs"/>
         </a:defRPr>
       </a:lvl8pPr>
-      <a:lvl9pPr marL="2438522" algn="l" defTabSz="609630" rtl="0" eaLnBrk="1" latinLnBrk="0" hangingPunct="1">
-        <a:defRPr sz="1200" kern="1200">
+      <a:lvl9pPr marL="2535814" algn="l" defTabSz="633954" rtl="0" eaLnBrk="1" latinLnBrk="0" hangingPunct="1">
+        <a:defRPr sz="1248" kern="1200">
           <a:solidFill>
             <a:schemeClr val="tx1"/>
           </a:solidFill>
@@ -2987,7 +3428,7 @@
         </p:nvSpPr>
         <p:spPr>
           <a:xfrm>
-            <a:off x="4418501" y="1263886"/>
+            <a:off x="4418501" y="1914624"/>
             <a:ext cx="6697980" cy="477054"/>
           </a:xfrm>
           <a:prstGeom prst="rect">
@@ -3073,7 +3514,7 @@
         </p:nvCxnSpPr>
         <p:spPr>
           <a:xfrm>
-            <a:off x="1605547" y="1515755"/>
+            <a:off x="1605551" y="2166493"/>
             <a:ext cx="2785439" cy="0"/>
           </a:xfrm>
           <a:prstGeom prst="line">
@@ -3116,7 +3557,7 @@
         </p:nvCxnSpPr>
         <p:spPr>
           <a:xfrm>
-            <a:off x="1605541" y="1936309"/>
+            <a:off x="1605541" y="2548410"/>
             <a:ext cx="2054114" cy="0"/>
           </a:xfrm>
           <a:prstGeom prst="line">
@@ -3159,7 +3600,7 @@
         </p:nvCxnSpPr>
         <p:spPr>
           <a:xfrm>
-            <a:off x="9011112" y="1515755"/>
+            <a:off x="9011116" y="2166493"/>
             <a:ext cx="2573401" cy="0"/>
           </a:xfrm>
           <a:prstGeom prst="line">
@@ -3202,7 +3643,7 @@
         </p:nvCxnSpPr>
         <p:spPr>
           <a:xfrm>
-            <a:off x="9592310" y="1936309"/>
+            <a:off x="9592314" y="2548410"/>
             <a:ext cx="1992203" cy="0"/>
           </a:xfrm>
           <a:prstGeom prst="line">
@@ -3243,7 +3684,7 @@
         </p:nvSpPr>
         <p:spPr>
           <a:xfrm>
-            <a:off x="233405" y="1305397"/>
+            <a:off x="233413" y="1956135"/>
             <a:ext cx="1237617" cy="369332"/>
           </a:xfrm>
           <a:prstGeom prst="rect">
@@ -3280,7 +3721,7 @@
         </p:nvSpPr>
         <p:spPr>
           <a:xfrm>
-            <a:off x="3659655" y="1689162"/>
+            <a:off x="3659655" y="2301263"/>
             <a:ext cx="5959730" cy="477054"/>
           </a:xfrm>
           <a:prstGeom prst="rect">
@@ -3388,7 +3829,7 @@
         </p:nvSpPr>
         <p:spPr>
           <a:xfrm>
-            <a:off x="233405" y="1745672"/>
+            <a:off x="233413" y="2357773"/>
             <a:ext cx="1237617" cy="369332"/>
           </a:xfrm>
           <a:prstGeom prst="rect">
@@ -3424,7 +3865,7 @@
         </p:nvSpPr>
         <p:spPr>
           <a:xfrm>
-            <a:off x="11746997" y="1340155"/>
+            <a:off x="11740900" y="1990893"/>
             <a:ext cx="1237617" cy="369332"/>
           </a:xfrm>
           <a:prstGeom prst="rect">
@@ -3459,7 +3900,7 @@
         </p:nvSpPr>
         <p:spPr>
           <a:xfrm>
-            <a:off x="11746997" y="1767307"/>
+            <a:off x="11740900" y="2379408"/>
             <a:ext cx="1237617" cy="369332"/>
           </a:xfrm>
           <a:prstGeom prst="rect">
@@ -3496,7 +3937,7 @@
         </p:nvCxnSpPr>
         <p:spPr>
           <a:xfrm>
-            <a:off x="1605541" y="3162833"/>
+            <a:off x="1605541" y="3762055"/>
             <a:ext cx="1303020" cy="0"/>
           </a:xfrm>
           <a:prstGeom prst="line">
@@ -3537,7 +3978,7 @@
         </p:nvCxnSpPr>
         <p:spPr>
           <a:xfrm>
-            <a:off x="10281487" y="3162833"/>
+            <a:off x="10281487" y="3762055"/>
             <a:ext cx="1303020" cy="0"/>
           </a:xfrm>
           <a:prstGeom prst="line">
@@ -3578,7 +4019,7 @@
         </p:nvSpPr>
         <p:spPr>
           <a:xfrm>
-            <a:off x="2908561" y="2929279"/>
+            <a:off x="2908561" y="3528501"/>
             <a:ext cx="7615784" cy="477054"/>
           </a:xfrm>
           <a:prstGeom prst="rect">
@@ -3686,7 +4127,7 @@
         </p:nvSpPr>
         <p:spPr>
           <a:xfrm>
-            <a:off x="233409" y="2992191"/>
+            <a:off x="233413" y="3591413"/>
             <a:ext cx="1237617" cy="369332"/>
           </a:xfrm>
           <a:prstGeom prst="rect">
@@ -3723,7 +4164,7 @@
         </p:nvSpPr>
         <p:spPr>
           <a:xfrm>
-            <a:off x="11747001" y="3000705"/>
+            <a:off x="11740900" y="3599927"/>
             <a:ext cx="1237617" cy="369332"/>
           </a:xfrm>
           <a:prstGeom prst="rect">
@@ -3758,7 +4199,7 @@
         </p:nvSpPr>
         <p:spPr>
           <a:xfrm rot="16200000">
-            <a:off x="9410552" y="3067837"/>
+            <a:off x="9410552" y="3447923"/>
             <a:ext cx="369332" cy="1338398"/>
           </a:xfrm>
           <a:prstGeom prst="leftBrace">
@@ -3810,7 +4251,7 @@
         </p:nvSpPr>
         <p:spPr>
           <a:xfrm rot="16200000">
-            <a:off x="3557897" y="3040775"/>
+            <a:off x="3557901" y="3420861"/>
             <a:ext cx="409377" cy="1438850"/>
           </a:xfrm>
           <a:prstGeom prst="leftBrace">
@@ -3862,7 +4303,7 @@
         </p:nvSpPr>
         <p:spPr>
           <a:xfrm rot="16200000">
-            <a:off x="6212659" y="1913371"/>
+            <a:off x="6212663" y="2293457"/>
             <a:ext cx="409377" cy="3715436"/>
           </a:xfrm>
           <a:prstGeom prst="leftBrace">
@@ -3914,7 +4355,7 @@
         </p:nvSpPr>
         <p:spPr>
           <a:xfrm rot="16200000">
-            <a:off x="8435289" y="3466635"/>
+            <a:off x="8435293" y="3846721"/>
             <a:ext cx="330521" cy="565346"/>
           </a:xfrm>
           <a:prstGeom prst="leftBrace">
@@ -3966,7 +4407,7 @@
         </p:nvSpPr>
         <p:spPr>
           <a:xfrm>
-            <a:off x="5688465" y="4006190"/>
+            <a:off x="5688465" y="4386276"/>
             <a:ext cx="2055976" cy="400110"/>
           </a:xfrm>
           <a:prstGeom prst="rect">
@@ -4004,7 +4445,7 @@
         </p:nvSpPr>
         <p:spPr>
           <a:xfrm>
-            <a:off x="7907884" y="4006190"/>
+            <a:off x="7907888" y="4386276"/>
             <a:ext cx="1392923" cy="400110"/>
           </a:xfrm>
           <a:prstGeom prst="rect">
@@ -4042,7 +4483,7 @@
         </p:nvSpPr>
         <p:spPr>
           <a:xfrm>
-            <a:off x="9300807" y="4006190"/>
+            <a:off x="9300811" y="4386276"/>
             <a:ext cx="767823" cy="400110"/>
           </a:xfrm>
           <a:prstGeom prst="rect">
@@ -4080,7 +4521,7 @@
         </p:nvSpPr>
         <p:spPr>
           <a:xfrm>
-            <a:off x="3364295" y="4006190"/>
+            <a:off x="3364299" y="4386276"/>
             <a:ext cx="767823" cy="400110"/>
           </a:xfrm>
           <a:prstGeom prst="rect">
@@ -4104,483 +4545,504 @@
           </a:p>
         </p:txBody>
       </p:sp>
-      <p:sp>
-        <p:nvSpPr>
-          <p:cNvPr id="138" name="TextBox 137">
+      <p:grpSp>
+        <p:nvGrpSpPr>
+          <p:cNvPr id="2" name="Group 1">
             <a:extLst>
               <a:ext uri="{FF2B5EF4-FFF2-40B4-BE49-F238E27FC236}">
-                <a16:creationId xmlns:a16="http://schemas.microsoft.com/office/drawing/2014/main" id="{9BFC8EEB-1A0D-0A48-98DE-1BB80F380F5A}"/>
+                <a16:creationId xmlns:a16="http://schemas.microsoft.com/office/drawing/2014/main" id="{DF7CAE90-9EDC-D9CD-57F4-77EB9BEB22E1}"/>
               </a:ext>
             </a:extLst>
           </p:cNvPr>
-          <p:cNvSpPr txBox="1"/>
+          <p:cNvGrpSpPr/>
           <p:nvPr/>
-        </p:nvSpPr>
-        <p:spPr>
+        </p:nvGrpSpPr>
+        <p:grpSpPr>
           <a:xfrm>
-            <a:off x="4418501" y="848982"/>
-            <a:ext cx="6697980" cy="477054"/>
-          </a:xfrm>
-          <a:prstGeom prst="rect">
-            <a:avLst/>
-          </a:prstGeom>
-          <a:noFill/>
-        </p:spPr>
-        <p:txBody>
-          <a:bodyPr wrap="square" rtlCol="0">
-            <a:spAutoFit/>
-          </a:bodyPr>
-          <a:lstStyle/>
-          <a:p>
-            <a:r>
-              <a:rPr lang="en-US" sz="2500" dirty="0">
-                <a:solidFill>
-                  <a:schemeClr val="accent4">
-                    <a:lumMod val="60000"/>
-                    <a:lumOff val="40000"/>
-                  </a:schemeClr>
-                </a:solidFill>
-                <a:latin typeface="Courier" pitchFamily="2" charset="0"/>
-              </a:rPr>
-              <a:t>ATCGATGCTGATGCTA</a:t>
-            </a:r>
-            <a:r>
-              <a:rPr lang="en-US" sz="2500" dirty="0">
-                <a:solidFill>
-                  <a:srgbClr val="FF0000"/>
-                </a:solidFill>
-                <a:latin typeface="Courier" pitchFamily="2" charset="0"/>
-              </a:rPr>
-              <a:t>G</a:t>
-            </a:r>
-            <a:r>
-              <a:rPr lang="en-US" sz="2500" dirty="0">
-                <a:solidFill>
-                  <a:schemeClr val="accent4">
-                    <a:lumMod val="60000"/>
-                    <a:lumOff val="40000"/>
-                  </a:schemeClr>
-                </a:solidFill>
-                <a:latin typeface="Courier" pitchFamily="2" charset="0"/>
-              </a:rPr>
-              <a:t>ATA</a:t>
-            </a:r>
-            <a:r>
-              <a:rPr lang="en-US" sz="2500" dirty="0">
-                <a:solidFill>
-                  <a:srgbClr val="FF0000"/>
-                </a:solidFill>
-                <a:latin typeface="Courier" pitchFamily="2" charset="0"/>
-              </a:rPr>
-              <a:t>A</a:t>
-            </a:r>
-            <a:r>
-              <a:rPr lang="en-US" sz="2500" dirty="0">
-                <a:solidFill>
-                  <a:schemeClr val="accent2">
-                    <a:lumMod val="75000"/>
-                  </a:schemeClr>
-                </a:solidFill>
-                <a:latin typeface="Courier" pitchFamily="2" charset="0"/>
-              </a:rPr>
-              <a:t>GG</a:t>
-            </a:r>
-          </a:p>
-        </p:txBody>
-      </p:sp>
-      <p:cxnSp>
-        <p:nvCxnSpPr>
-          <p:cNvPr id="139" name="Straight Connector 138">
-            <a:extLst>
-              <a:ext uri="{FF2B5EF4-FFF2-40B4-BE49-F238E27FC236}">
-                <a16:creationId xmlns:a16="http://schemas.microsoft.com/office/drawing/2014/main" id="{9B502C1C-B6D0-2F4B-AC27-CA377546D459}"/>
-              </a:ext>
-            </a:extLst>
-          </p:cNvPr>
-          <p:cNvCxnSpPr>
-            <a:cxnSpLocks/>
-          </p:cNvCxnSpPr>
-          <p:nvPr/>
-        </p:nvCxnSpPr>
-        <p:spPr>
-          <a:xfrm>
-            <a:off x="1605547" y="1100851"/>
-            <a:ext cx="2769397" cy="0"/>
-          </a:xfrm>
-          <a:prstGeom prst="line">
-            <a:avLst/>
-          </a:prstGeom>
-          <a:ln w="22225">
-            <a:solidFill>
+            <a:off x="-164978" y="60491"/>
+            <a:ext cx="13149592" cy="1170845"/>
+            <a:chOff x="-164978" y="1983991"/>
+            <a:chExt cx="13149592" cy="1170845"/>
+          </a:xfrm>
+        </p:grpSpPr>
+        <p:sp>
+          <p:nvSpPr>
+            <p:cNvPr id="138" name="TextBox 137">
+              <a:extLst>
+                <a:ext uri="{FF2B5EF4-FFF2-40B4-BE49-F238E27FC236}">
+                  <a16:creationId xmlns:a16="http://schemas.microsoft.com/office/drawing/2014/main" id="{9BFC8EEB-1A0D-0A48-98DE-1BB80F380F5A}"/>
+                </a:ext>
+              </a:extLst>
+            </p:cNvPr>
+            <p:cNvSpPr txBox="1"/>
+            <p:nvPr/>
+          </p:nvSpPr>
+          <p:spPr>
+            <a:xfrm>
+              <a:off x="4418501" y="2677782"/>
+              <a:ext cx="6697980" cy="477054"/>
+            </a:xfrm>
+            <a:prstGeom prst="rect">
+              <a:avLst/>
+            </a:prstGeom>
+            <a:noFill/>
+          </p:spPr>
+          <p:txBody>
+            <a:bodyPr wrap="square" rtlCol="0">
+              <a:spAutoFit/>
+            </a:bodyPr>
+            <a:lstStyle/>
+            <a:p>
+              <a:r>
+                <a:rPr lang="en-US" sz="2500" dirty="0">
+                  <a:solidFill>
+                    <a:schemeClr val="accent4">
+                      <a:lumMod val="60000"/>
+                      <a:lumOff val="40000"/>
+                    </a:schemeClr>
+                  </a:solidFill>
+                  <a:latin typeface="Courier" pitchFamily="2" charset="0"/>
+                </a:rPr>
+                <a:t>ATCGATGCTGATGCTA</a:t>
+              </a:r>
+              <a:r>
+                <a:rPr lang="en-US" sz="2500" dirty="0">
+                  <a:solidFill>
+                    <a:srgbClr val="FF0000"/>
+                  </a:solidFill>
+                  <a:latin typeface="Courier" pitchFamily="2" charset="0"/>
+                </a:rPr>
+                <a:t>G</a:t>
+              </a:r>
+              <a:r>
+                <a:rPr lang="en-US" sz="2500" dirty="0">
+                  <a:solidFill>
+                    <a:schemeClr val="accent4">
+                      <a:lumMod val="60000"/>
+                      <a:lumOff val="40000"/>
+                    </a:schemeClr>
+                  </a:solidFill>
+                  <a:latin typeface="Courier" pitchFamily="2" charset="0"/>
+                </a:rPr>
+                <a:t>ATA</a:t>
+              </a:r>
+              <a:r>
+                <a:rPr lang="en-US" sz="2500" dirty="0">
+                  <a:solidFill>
+                    <a:srgbClr val="FF0000"/>
+                  </a:solidFill>
+                  <a:latin typeface="Courier" pitchFamily="2" charset="0"/>
+                </a:rPr>
+                <a:t>A</a:t>
+              </a:r>
+              <a:r>
+                <a:rPr lang="en-US" sz="2500" dirty="0">
+                  <a:solidFill>
+                    <a:schemeClr val="accent2">
+                      <a:lumMod val="75000"/>
+                    </a:schemeClr>
+                  </a:solidFill>
+                  <a:latin typeface="Courier" pitchFamily="2" charset="0"/>
+                </a:rPr>
+                <a:t>GG</a:t>
+              </a:r>
+            </a:p>
+          </p:txBody>
+        </p:sp>
+        <p:cxnSp>
+          <p:nvCxnSpPr>
+            <p:cNvPr id="139" name="Straight Connector 138">
+              <a:extLst>
+                <a:ext uri="{FF2B5EF4-FFF2-40B4-BE49-F238E27FC236}">
+                  <a16:creationId xmlns:a16="http://schemas.microsoft.com/office/drawing/2014/main" id="{9B502C1C-B6D0-2F4B-AC27-CA377546D459}"/>
+                </a:ext>
+              </a:extLst>
+            </p:cNvPr>
+            <p:cNvCxnSpPr>
+              <a:cxnSpLocks/>
+            </p:cNvCxnSpPr>
+            <p:nvPr/>
+          </p:nvCxnSpPr>
+          <p:spPr>
+            <a:xfrm>
+              <a:off x="1605548" y="2929651"/>
+              <a:ext cx="2769397" cy="0"/>
+            </a:xfrm>
+            <a:prstGeom prst="line">
+              <a:avLst/>
+            </a:prstGeom>
+            <a:ln w="22225">
+              <a:solidFill>
+                <a:schemeClr val="tx1"/>
+              </a:solidFill>
+            </a:ln>
+          </p:spPr>
+          <p:style>
+            <a:lnRef idx="1">
+              <a:schemeClr val="accent1"/>
+            </a:lnRef>
+            <a:fillRef idx="0">
+              <a:schemeClr val="accent1"/>
+            </a:fillRef>
+            <a:effectRef idx="0">
+              <a:schemeClr val="accent1"/>
+            </a:effectRef>
+            <a:fontRef idx="minor">
               <a:schemeClr val="tx1"/>
-            </a:solidFill>
-          </a:ln>
-        </p:spPr>
-        <p:style>
-          <a:lnRef idx="1">
-            <a:schemeClr val="accent1"/>
-          </a:lnRef>
-          <a:fillRef idx="0">
-            <a:schemeClr val="accent1"/>
-          </a:fillRef>
-          <a:effectRef idx="0">
-            <a:schemeClr val="accent1"/>
-          </a:effectRef>
-          <a:fontRef idx="minor">
-            <a:schemeClr val="tx1"/>
-          </a:fontRef>
-        </p:style>
-      </p:cxnSp>
-      <p:cxnSp>
-        <p:nvCxnSpPr>
-          <p:cNvPr id="140" name="Straight Connector 139">
-            <a:extLst>
-              <a:ext uri="{FF2B5EF4-FFF2-40B4-BE49-F238E27FC236}">
-                <a16:creationId xmlns:a16="http://schemas.microsoft.com/office/drawing/2014/main" id="{B25D61B9-2E97-5A45-AE38-ED08B9B042B9}"/>
-              </a:ext>
-            </a:extLst>
-          </p:cNvPr>
-          <p:cNvCxnSpPr>
-            <a:cxnSpLocks/>
-          </p:cNvCxnSpPr>
-          <p:nvPr/>
-        </p:nvCxnSpPr>
-        <p:spPr>
-          <a:xfrm>
-            <a:off x="8979028" y="1100851"/>
-            <a:ext cx="2605485" cy="0"/>
-          </a:xfrm>
-          <a:prstGeom prst="line">
-            <a:avLst/>
-          </a:prstGeom>
-          <a:ln w="22225">
-            <a:solidFill>
+            </a:fontRef>
+          </p:style>
+        </p:cxnSp>
+        <p:cxnSp>
+          <p:nvCxnSpPr>
+            <p:cNvPr id="140" name="Straight Connector 139">
+              <a:extLst>
+                <a:ext uri="{FF2B5EF4-FFF2-40B4-BE49-F238E27FC236}">
+                  <a16:creationId xmlns:a16="http://schemas.microsoft.com/office/drawing/2014/main" id="{B25D61B9-2E97-5A45-AE38-ED08B9B042B9}"/>
+                </a:ext>
+              </a:extLst>
+            </p:cNvPr>
+            <p:cNvCxnSpPr>
+              <a:cxnSpLocks/>
+            </p:cNvCxnSpPr>
+            <p:nvPr/>
+          </p:nvCxnSpPr>
+          <p:spPr>
+            <a:xfrm>
+              <a:off x="8979029" y="2929651"/>
+              <a:ext cx="2605485" cy="0"/>
+            </a:xfrm>
+            <a:prstGeom prst="line">
+              <a:avLst/>
+            </a:prstGeom>
+            <a:ln w="22225">
+              <a:solidFill>
+                <a:schemeClr val="tx1"/>
+              </a:solidFill>
+            </a:ln>
+          </p:spPr>
+          <p:style>
+            <a:lnRef idx="1">
+              <a:schemeClr val="accent1"/>
+            </a:lnRef>
+            <a:fillRef idx="0">
+              <a:schemeClr val="accent1"/>
+            </a:fillRef>
+            <a:effectRef idx="0">
+              <a:schemeClr val="accent1"/>
+            </a:effectRef>
+            <a:fontRef idx="minor">
               <a:schemeClr val="tx1"/>
-            </a:solidFill>
-          </a:ln>
-        </p:spPr>
-        <p:style>
-          <a:lnRef idx="1">
-            <a:schemeClr val="accent1"/>
-          </a:lnRef>
-          <a:fillRef idx="0">
-            <a:schemeClr val="accent1"/>
-          </a:fillRef>
-          <a:effectRef idx="0">
-            <a:schemeClr val="accent1"/>
-          </a:effectRef>
-          <a:fontRef idx="minor">
-            <a:schemeClr val="tx1"/>
-          </a:fontRef>
-        </p:style>
-      </p:cxnSp>
-      <p:cxnSp>
-        <p:nvCxnSpPr>
-          <p:cNvPr id="141" name="Straight Arrow Connector 140">
-            <a:extLst>
-              <a:ext uri="{FF2B5EF4-FFF2-40B4-BE49-F238E27FC236}">
-                <a16:creationId xmlns:a16="http://schemas.microsoft.com/office/drawing/2014/main" id="{08BDB0FE-E39F-7444-A79D-D79DF408280C}"/>
-              </a:ext>
-            </a:extLst>
-          </p:cNvPr>
-          <p:cNvCxnSpPr>
-            <a:cxnSpLocks/>
-          </p:cNvCxnSpPr>
-          <p:nvPr/>
-        </p:nvCxnSpPr>
-        <p:spPr>
-          <a:xfrm flipV="1">
-            <a:off x="8427363" y="506200"/>
-            <a:ext cx="0" cy="383391"/>
-          </a:xfrm>
-          <a:prstGeom prst="straightConnector1">
-            <a:avLst/>
-          </a:prstGeom>
-          <a:ln w="28575">
-            <a:solidFill>
-              <a:srgbClr val="FF0000"/>
-            </a:solidFill>
-            <a:tailEnd type="triangle"/>
-          </a:ln>
-        </p:spPr>
-        <p:style>
-          <a:lnRef idx="1">
-            <a:schemeClr val="accent1"/>
-          </a:lnRef>
-          <a:fillRef idx="0">
-            <a:schemeClr val="accent1"/>
-          </a:fillRef>
-          <a:effectRef idx="0">
-            <a:schemeClr val="accent1"/>
-          </a:effectRef>
-          <a:fontRef idx="minor">
-            <a:schemeClr val="tx1"/>
-          </a:fontRef>
-        </p:style>
-      </p:cxnSp>
-      <p:sp>
-        <p:nvSpPr>
-          <p:cNvPr id="142" name="TextBox 141">
-            <a:extLst>
-              <a:ext uri="{FF2B5EF4-FFF2-40B4-BE49-F238E27FC236}">
-                <a16:creationId xmlns:a16="http://schemas.microsoft.com/office/drawing/2014/main" id="{2C44025A-0A77-AF4E-BFFE-9F92B6CB07BE}"/>
-              </a:ext>
-            </a:extLst>
-          </p:cNvPr>
-          <p:cNvSpPr txBox="1"/>
-          <p:nvPr/>
-        </p:nvSpPr>
-        <p:spPr>
-          <a:xfrm>
-            <a:off x="7907874" y="155191"/>
-            <a:ext cx="1584736" cy="369332"/>
-          </a:xfrm>
-          <a:prstGeom prst="rect">
-            <a:avLst/>
-          </a:prstGeom>
-          <a:noFill/>
-        </p:spPr>
-        <p:txBody>
-          <a:bodyPr wrap="square" rtlCol="0">
-            <a:spAutoFit/>
-          </a:bodyPr>
-          <a:lstStyle/>
-          <a:p>
-            <a:r>
-              <a:rPr lang="en-US" dirty="0">
-                <a:solidFill>
-                  <a:srgbClr val="FF0000"/>
-                </a:solidFill>
-              </a:rPr>
-              <a:t>PAM site</a:t>
-            </a:r>
-          </a:p>
-        </p:txBody>
-      </p:sp>
-      <p:sp>
-        <p:nvSpPr>
-          <p:cNvPr id="143" name="TextBox 142">
-            <a:extLst>
-              <a:ext uri="{FF2B5EF4-FFF2-40B4-BE49-F238E27FC236}">
-                <a16:creationId xmlns:a16="http://schemas.microsoft.com/office/drawing/2014/main" id="{A044D67F-480D-0B4F-8250-6375B2FE8220}"/>
-              </a:ext>
-            </a:extLst>
-          </p:cNvPr>
-          <p:cNvSpPr txBox="1"/>
-          <p:nvPr/>
-        </p:nvSpPr>
-        <p:spPr>
-          <a:xfrm>
-            <a:off x="6842635" y="155191"/>
-            <a:ext cx="1013263" cy="369332"/>
-          </a:xfrm>
-          <a:prstGeom prst="rect">
-            <a:avLst/>
-          </a:prstGeom>
-          <a:noFill/>
-        </p:spPr>
-        <p:txBody>
-          <a:bodyPr wrap="square" rtlCol="0">
-            <a:spAutoFit/>
-          </a:bodyPr>
-          <a:lstStyle/>
-          <a:p>
-            <a:r>
-              <a:rPr lang="en-US" dirty="0">
-                <a:solidFill>
-                  <a:srgbClr val="FF0000"/>
-                </a:solidFill>
-              </a:rPr>
-              <a:t>Cut site</a:t>
-            </a:r>
-          </a:p>
-        </p:txBody>
-      </p:sp>
-      <p:cxnSp>
-        <p:nvCxnSpPr>
-          <p:cNvPr id="144" name="Straight Arrow Connector 143">
-            <a:extLst>
-              <a:ext uri="{FF2B5EF4-FFF2-40B4-BE49-F238E27FC236}">
-                <a16:creationId xmlns:a16="http://schemas.microsoft.com/office/drawing/2014/main" id="{48009394-0FA5-D349-9E57-A50B993AB067}"/>
-              </a:ext>
-            </a:extLst>
-          </p:cNvPr>
-          <p:cNvCxnSpPr>
-            <a:cxnSpLocks/>
-          </p:cNvCxnSpPr>
-          <p:nvPr/>
-        </p:nvCxnSpPr>
-        <p:spPr>
-          <a:xfrm flipH="1" flipV="1">
-            <a:off x="7426292" y="538214"/>
-            <a:ext cx="198141" cy="359620"/>
-          </a:xfrm>
-          <a:prstGeom prst="straightConnector1">
-            <a:avLst/>
-          </a:prstGeom>
-          <a:ln w="28575">
-            <a:solidFill>
-              <a:srgbClr val="FF0000"/>
-            </a:solidFill>
-            <a:tailEnd type="triangle"/>
-          </a:ln>
-        </p:spPr>
-        <p:style>
-          <a:lnRef idx="1">
-            <a:schemeClr val="accent1"/>
-          </a:lnRef>
-          <a:fillRef idx="0">
-            <a:schemeClr val="accent1"/>
-          </a:fillRef>
-          <a:effectRef idx="0">
-            <a:schemeClr val="accent1"/>
-          </a:effectRef>
-          <a:fontRef idx="minor">
-            <a:schemeClr val="tx1"/>
-          </a:fontRef>
-        </p:style>
-      </p:cxnSp>
-      <p:sp>
-        <p:nvSpPr>
-          <p:cNvPr id="145" name="TextBox 144">
-            <a:extLst>
-              <a:ext uri="{FF2B5EF4-FFF2-40B4-BE49-F238E27FC236}">
-                <a16:creationId xmlns:a16="http://schemas.microsoft.com/office/drawing/2014/main" id="{5AF12E23-815D-F947-9118-BD309A15DCDA}"/>
-              </a:ext>
-            </a:extLst>
-          </p:cNvPr>
-          <p:cNvSpPr txBox="1"/>
-          <p:nvPr/>
-        </p:nvSpPr>
-        <p:spPr>
-          <a:xfrm>
-            <a:off x="-164978" y="865122"/>
-            <a:ext cx="1635997" cy="369332"/>
-          </a:xfrm>
-          <a:prstGeom prst="rect">
-            <a:avLst/>
-          </a:prstGeom>
-          <a:noFill/>
-        </p:spPr>
-        <p:txBody>
-          <a:bodyPr wrap="square" rtlCol="0">
-            <a:spAutoFit/>
-          </a:bodyPr>
-          <a:lstStyle/>
-          <a:p>
-            <a:pPr algn="r"/>
-            <a:r>
-              <a:rPr lang="en-US" dirty="0"/>
-              <a:t>(Protospacer)</a:t>
-            </a:r>
-          </a:p>
-        </p:txBody>
-      </p:sp>
-      <p:sp>
-        <p:nvSpPr>
-          <p:cNvPr id="146" name="TextBox 145">
-            <a:extLst>
-              <a:ext uri="{FF2B5EF4-FFF2-40B4-BE49-F238E27FC236}">
-                <a16:creationId xmlns:a16="http://schemas.microsoft.com/office/drawing/2014/main" id="{D6AA5B2F-4151-2043-A295-4B32C2A0865B}"/>
-              </a:ext>
-            </a:extLst>
-          </p:cNvPr>
-          <p:cNvSpPr txBox="1"/>
-          <p:nvPr/>
-        </p:nvSpPr>
-        <p:spPr>
-          <a:xfrm>
-            <a:off x="4260800" y="718868"/>
-            <a:ext cx="1013263" cy="369332"/>
-          </a:xfrm>
-          <a:prstGeom prst="rect">
-            <a:avLst/>
-          </a:prstGeom>
-          <a:noFill/>
-        </p:spPr>
-        <p:txBody>
-          <a:bodyPr wrap="square" rtlCol="0">
-            <a:spAutoFit/>
-          </a:bodyPr>
-          <a:lstStyle/>
-          <a:p>
-            <a:r>
-              <a:rPr lang="en-US" dirty="0"/>
-              <a:t>5’</a:t>
-            </a:r>
-          </a:p>
-        </p:txBody>
-      </p:sp>
-      <p:sp>
-        <p:nvSpPr>
-          <p:cNvPr id="147" name="TextBox 146">
-            <a:extLst>
-              <a:ext uri="{FF2B5EF4-FFF2-40B4-BE49-F238E27FC236}">
-                <a16:creationId xmlns:a16="http://schemas.microsoft.com/office/drawing/2014/main" id="{EFE33A65-E663-3C49-AA65-B034A09DE076}"/>
-              </a:ext>
-            </a:extLst>
-          </p:cNvPr>
-          <p:cNvSpPr txBox="1"/>
-          <p:nvPr/>
-        </p:nvSpPr>
-        <p:spPr>
-          <a:xfrm>
-            <a:off x="8882491" y="718868"/>
-            <a:ext cx="1013263" cy="369332"/>
-          </a:xfrm>
-          <a:prstGeom prst="rect">
-            <a:avLst/>
-          </a:prstGeom>
-          <a:noFill/>
-        </p:spPr>
-        <p:txBody>
-          <a:bodyPr wrap="square" rtlCol="0">
-            <a:spAutoFit/>
-          </a:bodyPr>
-          <a:lstStyle/>
-          <a:p>
-            <a:r>
-              <a:rPr lang="en-US" dirty="0"/>
-              <a:t>3’</a:t>
-            </a:r>
-          </a:p>
-        </p:txBody>
-      </p:sp>
-      <p:sp>
-        <p:nvSpPr>
-          <p:cNvPr id="148" name="TextBox 147">
-            <a:extLst>
-              <a:ext uri="{FF2B5EF4-FFF2-40B4-BE49-F238E27FC236}">
-                <a16:creationId xmlns:a16="http://schemas.microsoft.com/office/drawing/2014/main" id="{E9884D7E-D945-8948-8883-D42511E75F73}"/>
-              </a:ext>
-            </a:extLst>
-          </p:cNvPr>
-          <p:cNvSpPr txBox="1"/>
-          <p:nvPr/>
-        </p:nvSpPr>
-        <p:spPr>
-          <a:xfrm>
-            <a:off x="11746996" y="913003"/>
-            <a:ext cx="1237617" cy="369332"/>
-          </a:xfrm>
-          <a:prstGeom prst="rect">
-            <a:avLst/>
-          </a:prstGeom>
-          <a:noFill/>
-        </p:spPr>
-        <p:txBody>
-          <a:bodyPr wrap="square" rtlCol="0">
-            <a:spAutoFit/>
-          </a:bodyPr>
-          <a:lstStyle/>
-          <a:p>
-            <a:r>
-              <a:rPr lang="en-US" dirty="0"/>
-              <a:t>23nt</a:t>
-            </a:r>
-          </a:p>
-        </p:txBody>
-      </p:sp>
+            </a:fontRef>
+          </p:style>
+        </p:cxnSp>
+        <p:cxnSp>
+          <p:nvCxnSpPr>
+            <p:cNvPr id="141" name="Straight Arrow Connector 140">
+              <a:extLst>
+                <a:ext uri="{FF2B5EF4-FFF2-40B4-BE49-F238E27FC236}">
+                  <a16:creationId xmlns:a16="http://schemas.microsoft.com/office/drawing/2014/main" id="{08BDB0FE-E39F-7444-A79D-D79DF408280C}"/>
+                </a:ext>
+              </a:extLst>
+            </p:cNvPr>
+            <p:cNvCxnSpPr>
+              <a:cxnSpLocks/>
+            </p:cNvCxnSpPr>
+            <p:nvPr/>
+          </p:nvCxnSpPr>
+          <p:spPr>
+            <a:xfrm flipV="1">
+              <a:off x="8427363" y="2335001"/>
+              <a:ext cx="0" cy="383391"/>
+            </a:xfrm>
+            <a:prstGeom prst="straightConnector1">
+              <a:avLst/>
+            </a:prstGeom>
+            <a:ln w="28575">
+              <a:solidFill>
+                <a:srgbClr val="FF0000"/>
+              </a:solidFill>
+              <a:tailEnd type="triangle"/>
+            </a:ln>
+          </p:spPr>
+          <p:style>
+            <a:lnRef idx="1">
+              <a:schemeClr val="accent1"/>
+            </a:lnRef>
+            <a:fillRef idx="0">
+              <a:schemeClr val="accent1"/>
+            </a:fillRef>
+            <a:effectRef idx="0">
+              <a:schemeClr val="accent1"/>
+            </a:effectRef>
+            <a:fontRef idx="minor">
+              <a:schemeClr val="tx1"/>
+            </a:fontRef>
+          </p:style>
+        </p:cxnSp>
+        <p:sp>
+          <p:nvSpPr>
+            <p:cNvPr id="142" name="TextBox 141">
+              <a:extLst>
+                <a:ext uri="{FF2B5EF4-FFF2-40B4-BE49-F238E27FC236}">
+                  <a16:creationId xmlns:a16="http://schemas.microsoft.com/office/drawing/2014/main" id="{2C44025A-0A77-AF4E-BFFE-9F92B6CB07BE}"/>
+                </a:ext>
+              </a:extLst>
+            </p:cNvPr>
+            <p:cNvSpPr txBox="1"/>
+            <p:nvPr/>
+          </p:nvSpPr>
+          <p:spPr>
+            <a:xfrm>
+              <a:off x="7907874" y="1983991"/>
+              <a:ext cx="1584736" cy="369332"/>
+            </a:xfrm>
+            <a:prstGeom prst="rect">
+              <a:avLst/>
+            </a:prstGeom>
+            <a:noFill/>
+          </p:spPr>
+          <p:txBody>
+            <a:bodyPr wrap="square" rtlCol="0">
+              <a:spAutoFit/>
+            </a:bodyPr>
+            <a:lstStyle/>
+            <a:p>
+              <a:r>
+                <a:rPr lang="en-US" dirty="0">
+                  <a:solidFill>
+                    <a:srgbClr val="FF0000"/>
+                  </a:solidFill>
+                </a:rPr>
+                <a:t>PAM site</a:t>
+              </a:r>
+            </a:p>
+          </p:txBody>
+        </p:sp>
+        <p:sp>
+          <p:nvSpPr>
+            <p:cNvPr id="143" name="TextBox 142">
+              <a:extLst>
+                <a:ext uri="{FF2B5EF4-FFF2-40B4-BE49-F238E27FC236}">
+                  <a16:creationId xmlns:a16="http://schemas.microsoft.com/office/drawing/2014/main" id="{A044D67F-480D-0B4F-8250-6375B2FE8220}"/>
+                </a:ext>
+              </a:extLst>
+            </p:cNvPr>
+            <p:cNvSpPr txBox="1"/>
+            <p:nvPr/>
+          </p:nvSpPr>
+          <p:spPr>
+            <a:xfrm>
+              <a:off x="6842636" y="1983991"/>
+              <a:ext cx="1013263" cy="369332"/>
+            </a:xfrm>
+            <a:prstGeom prst="rect">
+              <a:avLst/>
+            </a:prstGeom>
+            <a:noFill/>
+          </p:spPr>
+          <p:txBody>
+            <a:bodyPr wrap="square" rtlCol="0">
+              <a:spAutoFit/>
+            </a:bodyPr>
+            <a:lstStyle/>
+            <a:p>
+              <a:r>
+                <a:rPr lang="en-US" dirty="0">
+                  <a:solidFill>
+                    <a:srgbClr val="FF0000"/>
+                  </a:solidFill>
+                </a:rPr>
+                <a:t>Cut site</a:t>
+              </a:r>
+            </a:p>
+          </p:txBody>
+        </p:sp>
+        <p:cxnSp>
+          <p:nvCxnSpPr>
+            <p:cNvPr id="144" name="Straight Arrow Connector 143">
+              <a:extLst>
+                <a:ext uri="{FF2B5EF4-FFF2-40B4-BE49-F238E27FC236}">
+                  <a16:creationId xmlns:a16="http://schemas.microsoft.com/office/drawing/2014/main" id="{48009394-0FA5-D349-9E57-A50B993AB067}"/>
+                </a:ext>
+              </a:extLst>
+            </p:cNvPr>
+            <p:cNvCxnSpPr>
+              <a:cxnSpLocks/>
+            </p:cNvCxnSpPr>
+            <p:nvPr/>
+          </p:nvCxnSpPr>
+          <p:spPr>
+            <a:xfrm flipH="1" flipV="1">
+              <a:off x="7426293" y="2367014"/>
+              <a:ext cx="198141" cy="359620"/>
+            </a:xfrm>
+            <a:prstGeom prst="straightConnector1">
+              <a:avLst/>
+            </a:prstGeom>
+            <a:ln w="28575">
+              <a:solidFill>
+                <a:srgbClr val="FF0000"/>
+              </a:solidFill>
+              <a:tailEnd type="triangle"/>
+            </a:ln>
+          </p:spPr>
+          <p:style>
+            <a:lnRef idx="1">
+              <a:schemeClr val="accent1"/>
+            </a:lnRef>
+            <a:fillRef idx="0">
+              <a:schemeClr val="accent1"/>
+            </a:fillRef>
+            <a:effectRef idx="0">
+              <a:schemeClr val="accent1"/>
+            </a:effectRef>
+            <a:fontRef idx="minor">
+              <a:schemeClr val="tx1"/>
+            </a:fontRef>
+          </p:style>
+        </p:cxnSp>
+        <p:sp>
+          <p:nvSpPr>
+            <p:cNvPr id="145" name="TextBox 144">
+              <a:extLst>
+                <a:ext uri="{FF2B5EF4-FFF2-40B4-BE49-F238E27FC236}">
+                  <a16:creationId xmlns:a16="http://schemas.microsoft.com/office/drawing/2014/main" id="{5AF12E23-815D-F947-9118-BD309A15DCDA}"/>
+                </a:ext>
+              </a:extLst>
+            </p:cNvPr>
+            <p:cNvSpPr txBox="1"/>
+            <p:nvPr/>
+          </p:nvSpPr>
+          <p:spPr>
+            <a:xfrm>
+              <a:off x="-164978" y="2693922"/>
+              <a:ext cx="1635997" cy="369332"/>
+            </a:xfrm>
+            <a:prstGeom prst="rect">
+              <a:avLst/>
+            </a:prstGeom>
+            <a:noFill/>
+          </p:spPr>
+          <p:txBody>
+            <a:bodyPr wrap="square" rtlCol="0">
+              <a:spAutoFit/>
+            </a:bodyPr>
+            <a:lstStyle/>
+            <a:p>
+              <a:pPr algn="r"/>
+              <a:r>
+                <a:rPr lang="en-US" dirty="0"/>
+                <a:t>(Protospacer)</a:t>
+              </a:r>
+            </a:p>
+          </p:txBody>
+        </p:sp>
+        <p:sp>
+          <p:nvSpPr>
+            <p:cNvPr id="146" name="TextBox 145">
+              <a:extLst>
+                <a:ext uri="{FF2B5EF4-FFF2-40B4-BE49-F238E27FC236}">
+                  <a16:creationId xmlns:a16="http://schemas.microsoft.com/office/drawing/2014/main" id="{D6AA5B2F-4151-2043-A295-4B32C2A0865B}"/>
+                </a:ext>
+              </a:extLst>
+            </p:cNvPr>
+            <p:cNvSpPr txBox="1"/>
+            <p:nvPr/>
+          </p:nvSpPr>
+          <p:spPr>
+            <a:xfrm>
+              <a:off x="4260801" y="2547668"/>
+              <a:ext cx="1013263" cy="369332"/>
+            </a:xfrm>
+            <a:prstGeom prst="rect">
+              <a:avLst/>
+            </a:prstGeom>
+            <a:noFill/>
+          </p:spPr>
+          <p:txBody>
+            <a:bodyPr wrap="square" rtlCol="0">
+              <a:spAutoFit/>
+            </a:bodyPr>
+            <a:lstStyle/>
+            <a:p>
+              <a:r>
+                <a:rPr lang="en-US" dirty="0"/>
+                <a:t>5’</a:t>
+              </a:r>
+            </a:p>
+          </p:txBody>
+        </p:sp>
+        <p:sp>
+          <p:nvSpPr>
+            <p:cNvPr id="147" name="TextBox 146">
+              <a:extLst>
+                <a:ext uri="{FF2B5EF4-FFF2-40B4-BE49-F238E27FC236}">
+                  <a16:creationId xmlns:a16="http://schemas.microsoft.com/office/drawing/2014/main" id="{EFE33A65-E663-3C49-AA65-B034A09DE076}"/>
+                </a:ext>
+              </a:extLst>
+            </p:cNvPr>
+            <p:cNvSpPr txBox="1"/>
+            <p:nvPr/>
+          </p:nvSpPr>
+          <p:spPr>
+            <a:xfrm>
+              <a:off x="8882492" y="2547668"/>
+              <a:ext cx="1013263" cy="369332"/>
+            </a:xfrm>
+            <a:prstGeom prst="rect">
+              <a:avLst/>
+            </a:prstGeom>
+            <a:noFill/>
+          </p:spPr>
+          <p:txBody>
+            <a:bodyPr wrap="square" rtlCol="0">
+              <a:spAutoFit/>
+            </a:bodyPr>
+            <a:lstStyle/>
+            <a:p>
+              <a:r>
+                <a:rPr lang="en-US" dirty="0"/>
+                <a:t>3’</a:t>
+              </a:r>
+            </a:p>
+          </p:txBody>
+        </p:sp>
+        <p:sp>
+          <p:nvSpPr>
+            <p:cNvPr id="148" name="TextBox 147">
+              <a:extLst>
+                <a:ext uri="{FF2B5EF4-FFF2-40B4-BE49-F238E27FC236}">
+                  <a16:creationId xmlns:a16="http://schemas.microsoft.com/office/drawing/2014/main" id="{E9884D7E-D945-8948-8883-D42511E75F73}"/>
+                </a:ext>
+              </a:extLst>
+            </p:cNvPr>
+            <p:cNvSpPr txBox="1"/>
+            <p:nvPr/>
+          </p:nvSpPr>
+          <p:spPr>
+            <a:xfrm>
+              <a:off x="11746997" y="2741803"/>
+              <a:ext cx="1237617" cy="369332"/>
+            </a:xfrm>
+            <a:prstGeom prst="rect">
+              <a:avLst/>
+            </a:prstGeom>
+            <a:noFill/>
+          </p:spPr>
+          <p:txBody>
+            <a:bodyPr wrap="square" rtlCol="0">
+              <a:spAutoFit/>
+            </a:bodyPr>
+            <a:lstStyle/>
+            <a:p>
+              <a:r>
+                <a:rPr lang="en-US" dirty="0"/>
+                <a:t>23nt</a:t>
+              </a:r>
+            </a:p>
+          </p:txBody>
+        </p:sp>
+      </p:grpSp>
       <p:cxnSp>
         <p:nvCxnSpPr>
           <p:cNvPr id="36" name="Straight Connector 35">
@@ -4597,7 +5059,7 @@
         </p:nvCxnSpPr>
         <p:spPr>
           <a:xfrm>
-            <a:off x="1605541" y="2314832"/>
+            <a:off x="1605541" y="2926933"/>
             <a:ext cx="2054114" cy="0"/>
           </a:xfrm>
           <a:prstGeom prst="line">
@@ -4640,7 +5102,7 @@
         </p:nvCxnSpPr>
         <p:spPr>
           <a:xfrm>
-            <a:off x="9592310" y="2314832"/>
+            <a:off x="9592314" y="2926933"/>
             <a:ext cx="1992203" cy="0"/>
           </a:xfrm>
           <a:prstGeom prst="line">
@@ -4681,7 +5143,7 @@
         </p:nvSpPr>
         <p:spPr>
           <a:xfrm>
-            <a:off x="3659655" y="2067685"/>
+            <a:off x="3659655" y="2679786"/>
             <a:ext cx="5959730" cy="477054"/>
           </a:xfrm>
           <a:prstGeom prst="rect">
@@ -4789,7 +5251,7 @@
         </p:nvSpPr>
         <p:spPr>
           <a:xfrm>
-            <a:off x="233405" y="2124195"/>
+            <a:off x="233413" y="2736296"/>
             <a:ext cx="1237617" cy="369332"/>
           </a:xfrm>
           <a:prstGeom prst="rect">
@@ -4825,7 +5287,7 @@
         </p:nvSpPr>
         <p:spPr>
           <a:xfrm>
-            <a:off x="11746997" y="2145830"/>
+            <a:off x="11740900" y="2757931"/>
             <a:ext cx="1237617" cy="369332"/>
           </a:xfrm>
           <a:prstGeom prst="rect">
@@ -4862,7 +5324,7 @@
         </p:nvCxnSpPr>
         <p:spPr>
           <a:xfrm>
-            <a:off x="1605541" y="2722453"/>
+            <a:off x="1605541" y="3334554"/>
             <a:ext cx="1758754" cy="0"/>
           </a:xfrm>
           <a:prstGeom prst="line">
@@ -4905,7 +5367,7 @@
         </p:nvCxnSpPr>
         <p:spPr>
           <a:xfrm>
-            <a:off x="10068630" y="2722453"/>
+            <a:off x="10068634" y="3334554"/>
             <a:ext cx="1515883" cy="0"/>
           </a:xfrm>
           <a:prstGeom prst="line">
@@ -4946,7 +5408,7 @@
         </p:nvSpPr>
         <p:spPr>
           <a:xfrm>
-            <a:off x="3295471" y="2475306"/>
+            <a:off x="3295471" y="3087407"/>
             <a:ext cx="7228874" cy="477054"/>
           </a:xfrm>
           <a:prstGeom prst="rect">
@@ -5054,7 +5516,7 @@
         </p:nvSpPr>
         <p:spPr>
           <a:xfrm>
-            <a:off x="-164977" y="2531816"/>
+            <a:off x="-164977" y="3143917"/>
             <a:ext cx="1636000" cy="369332"/>
           </a:xfrm>
           <a:prstGeom prst="rect">
@@ -5091,7 +5553,7 @@
         </p:nvSpPr>
         <p:spPr>
           <a:xfrm>
-            <a:off x="11746997" y="2553451"/>
+            <a:off x="11740900" y="3165552"/>
             <a:ext cx="1237617" cy="369332"/>
           </a:xfrm>
           <a:prstGeom prst="rect">
@@ -5108,6 +5570,499 @@
             <a:r>
               <a:rPr lang="en-US" dirty="0"/>
               <a:t>35nt</a:t>
+            </a:r>
+          </a:p>
+        </p:txBody>
+      </p:sp>
+      <p:grpSp>
+        <p:nvGrpSpPr>
+          <p:cNvPr id="3" name="Group 2">
+            <a:extLst>
+              <a:ext uri="{FF2B5EF4-FFF2-40B4-BE49-F238E27FC236}">
+                <a16:creationId xmlns:a16="http://schemas.microsoft.com/office/drawing/2014/main" id="{9DC2141D-9A8D-5D3B-2F43-0E5B9FAEA2CA}"/>
+              </a:ext>
+            </a:extLst>
+          </p:cNvPr>
+          <p:cNvGrpSpPr/>
+          <p:nvPr/>
+        </p:nvGrpSpPr>
+        <p:grpSpPr>
+          <a:xfrm>
+            <a:off x="231261" y="1526110"/>
+            <a:ext cx="12751209" cy="477054"/>
+            <a:chOff x="231258" y="2729930"/>
+            <a:chExt cx="12751209" cy="477054"/>
+          </a:xfrm>
+        </p:grpSpPr>
+        <p:sp>
+          <p:nvSpPr>
+            <p:cNvPr id="47" name="TextBox 46">
+              <a:extLst>
+                <a:ext uri="{FF2B5EF4-FFF2-40B4-BE49-F238E27FC236}">
+                  <a16:creationId xmlns:a16="http://schemas.microsoft.com/office/drawing/2014/main" id="{C0AC3701-1CFD-729A-9FE7-705AEDC212EF}"/>
+                </a:ext>
+              </a:extLst>
+            </p:cNvPr>
+            <p:cNvSpPr txBox="1"/>
+            <p:nvPr/>
+          </p:nvSpPr>
+          <p:spPr>
+            <a:xfrm>
+              <a:off x="4416353" y="2729930"/>
+              <a:ext cx="6697980" cy="477054"/>
+            </a:xfrm>
+            <a:prstGeom prst="rect">
+              <a:avLst/>
+            </a:prstGeom>
+            <a:noFill/>
+          </p:spPr>
+          <p:txBody>
+            <a:bodyPr wrap="square" rtlCol="0">
+              <a:spAutoFit/>
+            </a:bodyPr>
+            <a:lstStyle/>
+            <a:p>
+              <a:r>
+                <a:rPr lang="en-US" sz="2500" dirty="0">
+                  <a:solidFill>
+                    <a:schemeClr val="accent4">
+                      <a:lumMod val="60000"/>
+                      <a:lumOff val="40000"/>
+                    </a:schemeClr>
+                  </a:solidFill>
+                  <a:latin typeface="Courier" pitchFamily="2" charset="0"/>
+                </a:rPr>
+                <a:t>ATCGATGCTGATGCTA</a:t>
+              </a:r>
+              <a:r>
+                <a:rPr lang="en-US" sz="2500" dirty="0">
+                  <a:solidFill>
+                    <a:srgbClr val="FF0000"/>
+                  </a:solidFill>
+                  <a:latin typeface="Courier" pitchFamily="2" charset="0"/>
+                </a:rPr>
+                <a:t>G</a:t>
+              </a:r>
+              <a:r>
+                <a:rPr lang="en-US" sz="2500" dirty="0">
+                  <a:solidFill>
+                    <a:schemeClr val="accent4">
+                      <a:lumMod val="60000"/>
+                      <a:lumOff val="40000"/>
+                    </a:schemeClr>
+                  </a:solidFill>
+                  <a:latin typeface="Courier" pitchFamily="2" charset="0"/>
+                </a:rPr>
+                <a:t>ATA</a:t>
+              </a:r>
+              <a:endParaRPr lang="en-US" sz="2500" dirty="0">
+                <a:solidFill>
+                  <a:schemeClr val="accent2">
+                    <a:lumMod val="75000"/>
+                  </a:schemeClr>
+                </a:solidFill>
+                <a:latin typeface="Courier" pitchFamily="2" charset="0"/>
+              </a:endParaRPr>
+            </a:p>
+          </p:txBody>
+        </p:sp>
+        <p:cxnSp>
+          <p:nvCxnSpPr>
+            <p:cNvPr id="48" name="Straight Connector 47">
+              <a:extLst>
+                <a:ext uri="{FF2B5EF4-FFF2-40B4-BE49-F238E27FC236}">
+                  <a16:creationId xmlns:a16="http://schemas.microsoft.com/office/drawing/2014/main" id="{3FB4061C-BDF0-6B0D-A3ED-FBF15FA27A19}"/>
+                </a:ext>
+              </a:extLst>
+            </p:cNvPr>
+            <p:cNvCxnSpPr>
+              <a:cxnSpLocks/>
+            </p:cNvCxnSpPr>
+            <p:nvPr/>
+          </p:nvCxnSpPr>
+          <p:spPr>
+            <a:xfrm>
+              <a:off x="1603400" y="2981799"/>
+              <a:ext cx="2785439" cy="0"/>
+            </a:xfrm>
+            <a:prstGeom prst="line">
+              <a:avLst/>
+            </a:prstGeom>
+            <a:ln w="22225">
+              <a:solidFill>
+                <a:schemeClr val="tx1"/>
+              </a:solidFill>
+            </a:ln>
+          </p:spPr>
+          <p:style>
+            <a:lnRef idx="1">
+              <a:schemeClr val="accent1"/>
+            </a:lnRef>
+            <a:fillRef idx="0">
+              <a:schemeClr val="accent1"/>
+            </a:fillRef>
+            <a:effectRef idx="0">
+              <a:schemeClr val="accent1"/>
+            </a:effectRef>
+            <a:fontRef idx="minor">
+              <a:schemeClr val="tx1"/>
+            </a:fontRef>
+          </p:style>
+        </p:cxnSp>
+        <p:cxnSp>
+          <p:nvCxnSpPr>
+            <p:cNvPr id="49" name="Straight Connector 48">
+              <a:extLst>
+                <a:ext uri="{FF2B5EF4-FFF2-40B4-BE49-F238E27FC236}">
+                  <a16:creationId xmlns:a16="http://schemas.microsoft.com/office/drawing/2014/main" id="{6059AE01-4F18-F1D0-6D8A-71336E8F8AAE}"/>
+                </a:ext>
+              </a:extLst>
+            </p:cNvPr>
+            <p:cNvCxnSpPr>
+              <a:cxnSpLocks/>
+            </p:cNvCxnSpPr>
+            <p:nvPr/>
+          </p:nvCxnSpPr>
+          <p:spPr>
+            <a:xfrm>
+              <a:off x="8427363" y="2981799"/>
+              <a:ext cx="3155003" cy="0"/>
+            </a:xfrm>
+            <a:prstGeom prst="line">
+              <a:avLst/>
+            </a:prstGeom>
+            <a:ln w="22225">
+              <a:solidFill>
+                <a:schemeClr val="tx1"/>
+              </a:solidFill>
+            </a:ln>
+          </p:spPr>
+          <p:style>
+            <a:lnRef idx="1">
+              <a:schemeClr val="accent1"/>
+            </a:lnRef>
+            <a:fillRef idx="0">
+              <a:schemeClr val="accent1"/>
+            </a:fillRef>
+            <a:effectRef idx="0">
+              <a:schemeClr val="accent1"/>
+            </a:effectRef>
+            <a:fontRef idx="minor">
+              <a:schemeClr val="tx1"/>
+            </a:fontRef>
+          </p:style>
+        </p:cxnSp>
+        <p:sp>
+          <p:nvSpPr>
+            <p:cNvPr id="50" name="TextBox 49">
+              <a:extLst>
+                <a:ext uri="{FF2B5EF4-FFF2-40B4-BE49-F238E27FC236}">
+                  <a16:creationId xmlns:a16="http://schemas.microsoft.com/office/drawing/2014/main" id="{D22877A7-21E2-1B5C-431F-CFA5E595693B}"/>
+                </a:ext>
+              </a:extLst>
+            </p:cNvPr>
+            <p:cNvSpPr txBox="1"/>
+            <p:nvPr/>
+          </p:nvSpPr>
+          <p:spPr>
+            <a:xfrm>
+              <a:off x="231258" y="2771441"/>
+              <a:ext cx="1237617" cy="369332"/>
+            </a:xfrm>
+            <a:prstGeom prst="rect">
+              <a:avLst/>
+            </a:prstGeom>
+            <a:noFill/>
+          </p:spPr>
+          <p:txBody>
+            <a:bodyPr wrap="square" rtlCol="0">
+              <a:spAutoFit/>
+            </a:bodyPr>
+            <a:lstStyle/>
+            <a:p>
+              <a:pPr algn="r"/>
+              <a:r>
+                <a:rPr lang="en-US" dirty="0" err="1"/>
+                <a:t>CRISPRater</a:t>
+              </a:r>
+              <a:endParaRPr lang="en-US" dirty="0"/>
+            </a:p>
+          </p:txBody>
+        </p:sp>
+        <p:sp>
+          <p:nvSpPr>
+            <p:cNvPr id="52" name="TextBox 51">
+              <a:extLst>
+                <a:ext uri="{FF2B5EF4-FFF2-40B4-BE49-F238E27FC236}">
+                  <a16:creationId xmlns:a16="http://schemas.microsoft.com/office/drawing/2014/main" id="{292D4A18-074B-47A0-72A1-FAD5859E3EA5}"/>
+                </a:ext>
+              </a:extLst>
+            </p:cNvPr>
+            <p:cNvSpPr txBox="1"/>
+            <p:nvPr/>
+          </p:nvSpPr>
+          <p:spPr>
+            <a:xfrm>
+              <a:off x="11744850" y="2806199"/>
+              <a:ext cx="1237617" cy="369332"/>
+            </a:xfrm>
+            <a:prstGeom prst="rect">
+              <a:avLst/>
+            </a:prstGeom>
+            <a:noFill/>
+          </p:spPr>
+          <p:txBody>
+            <a:bodyPr wrap="square" rtlCol="0">
+              <a:spAutoFit/>
+            </a:bodyPr>
+            <a:lstStyle/>
+            <a:p>
+              <a:r>
+                <a:rPr lang="en-US" dirty="0"/>
+                <a:t>20nt</a:t>
+              </a:r>
+            </a:p>
+          </p:txBody>
+        </p:sp>
+      </p:grpSp>
+      <p:sp>
+        <p:nvSpPr>
+          <p:cNvPr id="62" name="TextBox 61">
+            <a:extLst>
+              <a:ext uri="{FF2B5EF4-FFF2-40B4-BE49-F238E27FC236}">
+                <a16:creationId xmlns:a16="http://schemas.microsoft.com/office/drawing/2014/main" id="{4A77E9B4-D4DA-EB0B-450F-0488DB1B43B3}"/>
+              </a:ext>
+            </a:extLst>
+          </p:cNvPr>
+          <p:cNvSpPr txBox="1"/>
+          <p:nvPr/>
+        </p:nvSpPr>
+        <p:spPr>
+          <a:xfrm>
+            <a:off x="4412400" y="1139469"/>
+            <a:ext cx="6697980" cy="477054"/>
+          </a:xfrm>
+          <a:prstGeom prst="rect">
+            <a:avLst/>
+          </a:prstGeom>
+          <a:noFill/>
+        </p:spPr>
+        <p:txBody>
+          <a:bodyPr wrap="square" rtlCol="0">
+            <a:spAutoFit/>
+          </a:bodyPr>
+          <a:lstStyle/>
+          <a:p>
+            <a:r>
+              <a:rPr lang="en-US" sz="2500" dirty="0">
+                <a:solidFill>
+                  <a:schemeClr val="accent4">
+                    <a:lumMod val="60000"/>
+                    <a:lumOff val="40000"/>
+                  </a:schemeClr>
+                </a:solidFill>
+                <a:latin typeface="Courier" pitchFamily="2" charset="0"/>
+              </a:rPr>
+              <a:t> TCGATGCTGATGCTA</a:t>
+            </a:r>
+            <a:r>
+              <a:rPr lang="en-US" sz="2500" dirty="0">
+                <a:solidFill>
+                  <a:srgbClr val="FF0000"/>
+                </a:solidFill>
+                <a:latin typeface="Courier" pitchFamily="2" charset="0"/>
+              </a:rPr>
+              <a:t>G</a:t>
+            </a:r>
+            <a:r>
+              <a:rPr lang="en-US" sz="2500" dirty="0">
+                <a:solidFill>
+                  <a:schemeClr val="accent4">
+                    <a:lumMod val="60000"/>
+                    <a:lumOff val="40000"/>
+                  </a:schemeClr>
+                </a:solidFill>
+                <a:latin typeface="Courier" pitchFamily="2" charset="0"/>
+              </a:rPr>
+              <a:t>ATA</a:t>
+            </a:r>
+            <a:r>
+              <a:rPr lang="en-US" sz="2500" dirty="0">
+                <a:solidFill>
+                  <a:srgbClr val="FF0000"/>
+                </a:solidFill>
+                <a:latin typeface="Courier" pitchFamily="2" charset="0"/>
+              </a:rPr>
+              <a:t>A</a:t>
+            </a:r>
+            <a:r>
+              <a:rPr lang="en-US" sz="2500" dirty="0">
+                <a:solidFill>
+                  <a:schemeClr val="accent2">
+                    <a:lumMod val="75000"/>
+                  </a:schemeClr>
+                </a:solidFill>
+                <a:latin typeface="Courier" pitchFamily="2" charset="0"/>
+              </a:rPr>
+              <a:t>GG</a:t>
+            </a:r>
+          </a:p>
+        </p:txBody>
+      </p:sp>
+      <p:cxnSp>
+        <p:nvCxnSpPr>
+          <p:cNvPr id="63" name="Straight Connector 62">
+            <a:extLst>
+              <a:ext uri="{FF2B5EF4-FFF2-40B4-BE49-F238E27FC236}">
+                <a16:creationId xmlns:a16="http://schemas.microsoft.com/office/drawing/2014/main" id="{5EBD3026-D1D9-3957-6E48-1733F5B83971}"/>
+              </a:ext>
+            </a:extLst>
+          </p:cNvPr>
+          <p:cNvCxnSpPr>
+            <a:cxnSpLocks/>
+          </p:cNvCxnSpPr>
+          <p:nvPr/>
+        </p:nvCxnSpPr>
+        <p:spPr>
+          <a:xfrm flipV="1">
+            <a:off x="1599450" y="1390025"/>
+            <a:ext cx="2972553" cy="1315"/>
+          </a:xfrm>
+          <a:prstGeom prst="line">
+            <a:avLst/>
+          </a:prstGeom>
+          <a:ln w="22225">
+            <a:solidFill>
+              <a:schemeClr val="tx1"/>
+            </a:solidFill>
+          </a:ln>
+        </p:spPr>
+        <p:style>
+          <a:lnRef idx="1">
+            <a:schemeClr val="accent1"/>
+          </a:lnRef>
+          <a:fillRef idx="0">
+            <a:schemeClr val="accent1"/>
+          </a:fillRef>
+          <a:effectRef idx="0">
+            <a:schemeClr val="accent1"/>
+          </a:effectRef>
+          <a:fontRef idx="minor">
+            <a:schemeClr val="tx1"/>
+          </a:fontRef>
+        </p:style>
+      </p:cxnSp>
+      <p:cxnSp>
+        <p:nvCxnSpPr>
+          <p:cNvPr id="64" name="Straight Connector 63">
+            <a:extLst>
+              <a:ext uri="{FF2B5EF4-FFF2-40B4-BE49-F238E27FC236}">
+                <a16:creationId xmlns:a16="http://schemas.microsoft.com/office/drawing/2014/main" id="{C178C979-980A-CBCB-477C-85E75B41C471}"/>
+              </a:ext>
+            </a:extLst>
+          </p:cNvPr>
+          <p:cNvCxnSpPr>
+            <a:cxnSpLocks/>
+          </p:cNvCxnSpPr>
+          <p:nvPr/>
+        </p:nvCxnSpPr>
+        <p:spPr>
+          <a:xfrm>
+            <a:off x="9005015" y="1391338"/>
+            <a:ext cx="2573401" cy="0"/>
+          </a:xfrm>
+          <a:prstGeom prst="line">
+            <a:avLst/>
+          </a:prstGeom>
+          <a:ln w="22225">
+            <a:solidFill>
+              <a:schemeClr val="tx1"/>
+            </a:solidFill>
+          </a:ln>
+        </p:spPr>
+        <p:style>
+          <a:lnRef idx="1">
+            <a:schemeClr val="accent1"/>
+          </a:lnRef>
+          <a:fillRef idx="0">
+            <a:schemeClr val="accent1"/>
+          </a:fillRef>
+          <a:effectRef idx="0">
+            <a:schemeClr val="accent1"/>
+          </a:effectRef>
+          <a:fontRef idx="minor">
+            <a:schemeClr val="tx1"/>
+          </a:fontRef>
+        </p:style>
+      </p:cxnSp>
+      <p:sp>
+        <p:nvSpPr>
+          <p:cNvPr id="65" name="TextBox 64">
+            <a:extLst>
+              <a:ext uri="{FF2B5EF4-FFF2-40B4-BE49-F238E27FC236}">
+                <a16:creationId xmlns:a16="http://schemas.microsoft.com/office/drawing/2014/main" id="{4E1A89FC-F379-8691-9FF3-C303739CF444}"/>
+              </a:ext>
+            </a:extLst>
+          </p:cNvPr>
+          <p:cNvSpPr txBox="1"/>
+          <p:nvPr/>
+        </p:nvSpPr>
+        <p:spPr>
+          <a:xfrm>
+            <a:off x="233413" y="1180980"/>
+            <a:ext cx="1237617" cy="369332"/>
+          </a:xfrm>
+          <a:prstGeom prst="rect">
+            <a:avLst/>
+          </a:prstGeom>
+          <a:noFill/>
+        </p:spPr>
+        <p:txBody>
+          <a:bodyPr wrap="square" rtlCol="0">
+            <a:spAutoFit/>
+          </a:bodyPr>
+          <a:lstStyle/>
+          <a:p>
+            <a:pPr algn="r"/>
+            <a:r>
+              <a:rPr lang="en-US" dirty="0" err="1"/>
+              <a:t>CRISPRai</a:t>
+            </a:r>
+            <a:endParaRPr lang="en-US" dirty="0"/>
+          </a:p>
+        </p:txBody>
+      </p:sp>
+      <p:sp>
+        <p:nvSpPr>
+          <p:cNvPr id="66" name="TextBox 65">
+            <a:extLst>
+              <a:ext uri="{FF2B5EF4-FFF2-40B4-BE49-F238E27FC236}">
+                <a16:creationId xmlns:a16="http://schemas.microsoft.com/office/drawing/2014/main" id="{5910DDA3-C9D2-2587-09AB-CEB4814ECE5B}"/>
+              </a:ext>
+            </a:extLst>
+          </p:cNvPr>
+          <p:cNvSpPr txBox="1"/>
+          <p:nvPr/>
+        </p:nvSpPr>
+        <p:spPr>
+          <a:xfrm>
+            <a:off x="11740900" y="1161146"/>
+            <a:ext cx="1237617" cy="369332"/>
+          </a:xfrm>
+          <a:prstGeom prst="rect">
+            <a:avLst/>
+          </a:prstGeom>
+          <a:noFill/>
+        </p:spPr>
+        <p:txBody>
+          <a:bodyPr wrap="square" rtlCol="0">
+            <a:spAutoFit/>
+          </a:bodyPr>
+          <a:lstStyle/>
+          <a:p>
+            <a:r>
+              <a:rPr lang="en-US" dirty="0"/>
+              <a:t>22nt</a:t>
             </a:r>
           </a:p>
         </p:txBody>
@@ -5384,4 +6339,299 @@
     </a:ext>
   </a:extLst>
 </a:theme>
+</file>
+
+<file path=ppt/theme/theme2.xml><?xml version="1.0" encoding="utf-8"?>
+<a:theme xmlns:a="http://schemas.openxmlformats.org/drawingml/2006/main" name="Office Theme">
+  <a:themeElements>
+    <a:clrScheme name="Office">
+      <a:dk1>
+        <a:sysClr val="windowText" lastClr="000000"/>
+      </a:dk1>
+      <a:lt1>
+        <a:sysClr val="window" lastClr="FFFFFF"/>
+      </a:lt1>
+      <a:dk2>
+        <a:srgbClr val="44546A"/>
+      </a:dk2>
+      <a:lt2>
+        <a:srgbClr val="E7E6E6"/>
+      </a:lt2>
+      <a:accent1>
+        <a:srgbClr val="4472C4"/>
+      </a:accent1>
+      <a:accent2>
+        <a:srgbClr val="ED7D31"/>
+      </a:accent2>
+      <a:accent3>
+        <a:srgbClr val="A5A5A5"/>
+      </a:accent3>
+      <a:accent4>
+        <a:srgbClr val="FFC000"/>
+      </a:accent4>
+      <a:accent5>
+        <a:srgbClr val="5B9BD5"/>
+      </a:accent5>
+      <a:accent6>
+        <a:srgbClr val="70AD47"/>
+      </a:accent6>
+      <a:hlink>
+        <a:srgbClr val="0563C1"/>
+      </a:hlink>
+      <a:folHlink>
+        <a:srgbClr val="954F72"/>
+      </a:folHlink>
+    </a:clrScheme>
+    <a:fontScheme name="Office">
+      <a:majorFont>
+        <a:latin typeface="Calibri Light" panose="020F0302020204030204"/>
+        <a:ea typeface=""/>
+        <a:cs typeface=""/>
+        <a:font script="Jpan" typeface="游ゴシック Light"/>
+        <a:font script="Hang" typeface="맑은 고딕"/>
+        <a:font script="Hans" typeface="等线 Light"/>
+        <a:font script="Hant" typeface="新細明體"/>
+        <a:font script="Arab" typeface="Times New Roman"/>
+        <a:font script="Hebr" typeface="Times New Roman"/>
+        <a:font script="Thai" typeface="Angsana New"/>
+        <a:font script="Ethi" typeface="Nyala"/>
+        <a:font script="Beng" typeface="Vrinda"/>
+        <a:font script="Gujr" typeface="Shruti"/>
+        <a:font script="Khmr" typeface="MoolBoran"/>
+        <a:font script="Knda" typeface="Tunga"/>
+        <a:font script="Guru" typeface="Raavi"/>
+        <a:font script="Cans" typeface="Euphemia"/>
+        <a:font script="Cher" typeface="Plantagenet Cherokee"/>
+        <a:font script="Yiii" typeface="Microsoft Yi Baiti"/>
+        <a:font script="Tibt" typeface="Microsoft Himalaya"/>
+        <a:font script="Thaa" typeface="MV Boli"/>
+        <a:font script="Deva" typeface="Mangal"/>
+        <a:font script="Telu" typeface="Gautami"/>
+        <a:font script="Taml" typeface="Latha"/>
+        <a:font script="Syrc" typeface="Estrangelo Edessa"/>
+        <a:font script="Orya" typeface="Kalinga"/>
+        <a:font script="Mlym" typeface="Kartika"/>
+        <a:font script="Laoo" typeface="DokChampa"/>
+        <a:font script="Sinh" typeface="Iskoola Pota"/>
+        <a:font script="Mong" typeface="Mongolian Baiti"/>
+        <a:font script="Viet" typeface="Times New Roman"/>
+        <a:font script="Uigh" typeface="Microsoft Uighur"/>
+        <a:font script="Geor" typeface="Sylfaen"/>
+        <a:font script="Armn" typeface="Arial"/>
+        <a:font script="Bugi" typeface="Leelawadee UI"/>
+        <a:font script="Bopo" typeface="Microsoft JhengHei"/>
+        <a:font script="Java" typeface="Javanese Text"/>
+        <a:font script="Lisu" typeface="Segoe UI"/>
+        <a:font script="Mymr" typeface="Myanmar Text"/>
+        <a:font script="Nkoo" typeface="Ebrima"/>
+        <a:font script="Olck" typeface="Nirmala UI"/>
+        <a:font script="Osma" typeface="Ebrima"/>
+        <a:font script="Phag" typeface="Phagspa"/>
+        <a:font script="Syrn" typeface="Estrangelo Edessa"/>
+        <a:font script="Syrj" typeface="Estrangelo Edessa"/>
+        <a:font script="Syre" typeface="Estrangelo Edessa"/>
+        <a:font script="Sora" typeface="Nirmala UI"/>
+        <a:font script="Tale" typeface="Microsoft Tai Le"/>
+        <a:font script="Talu" typeface="Microsoft New Tai Lue"/>
+        <a:font script="Tfng" typeface="Ebrima"/>
+      </a:majorFont>
+      <a:minorFont>
+        <a:latin typeface="Calibri" panose="020F0502020204030204"/>
+        <a:ea typeface=""/>
+        <a:cs typeface=""/>
+        <a:font script="Jpan" typeface="游ゴシック"/>
+        <a:font script="Hang" typeface="맑은 고딕"/>
+        <a:font script="Hans" typeface="等线"/>
+        <a:font script="Hant" typeface="新細明體"/>
+        <a:font script="Arab" typeface="Arial"/>
+        <a:font script="Hebr" typeface="Arial"/>
+        <a:font script="Thai" typeface="Cordia New"/>
+        <a:font script="Ethi" typeface="Nyala"/>
+        <a:font script="Beng" typeface="Vrinda"/>
+        <a:font script="Gujr" typeface="Shruti"/>
+        <a:font script="Khmr" typeface="DaunPenh"/>
+        <a:font script="Knda" typeface="Tunga"/>
+        <a:font script="Guru" typeface="Raavi"/>
+        <a:font script="Cans" typeface="Euphemia"/>
+        <a:font script="Cher" typeface="Plantagenet Cherokee"/>
+        <a:font script="Yiii" typeface="Microsoft Yi Baiti"/>
+        <a:font script="Tibt" typeface="Microsoft Himalaya"/>
+        <a:font script="Thaa" typeface="MV Boli"/>
+        <a:font script="Deva" typeface="Mangal"/>
+        <a:font script="Telu" typeface="Gautami"/>
+        <a:font script="Taml" typeface="Latha"/>
+        <a:font script="Syrc" typeface="Estrangelo Edessa"/>
+        <a:font script="Orya" typeface="Kalinga"/>
+        <a:font script="Mlym" typeface="Kartika"/>
+        <a:font script="Laoo" typeface="DokChampa"/>
+        <a:font script="Sinh" typeface="Iskoola Pota"/>
+        <a:font script="Mong" typeface="Mongolian Baiti"/>
+        <a:font script="Viet" typeface="Arial"/>
+        <a:font script="Uigh" typeface="Microsoft Uighur"/>
+        <a:font script="Geor" typeface="Sylfaen"/>
+        <a:font script="Armn" typeface="Arial"/>
+        <a:font script="Bugi" typeface="Leelawadee UI"/>
+        <a:font script="Bopo" typeface="Microsoft JhengHei"/>
+        <a:font script="Java" typeface="Javanese Text"/>
+        <a:font script="Lisu" typeface="Segoe UI"/>
+        <a:font script="Mymr" typeface="Myanmar Text"/>
+        <a:font script="Nkoo" typeface="Ebrima"/>
+        <a:font script="Olck" typeface="Nirmala UI"/>
+        <a:font script="Osma" typeface="Ebrima"/>
+        <a:font script="Phag" typeface="Phagspa"/>
+        <a:font script="Syrn" typeface="Estrangelo Edessa"/>
+        <a:font script="Syrj" typeface="Estrangelo Edessa"/>
+        <a:font script="Syre" typeface="Estrangelo Edessa"/>
+        <a:font script="Sora" typeface="Nirmala UI"/>
+        <a:font script="Tale" typeface="Microsoft Tai Le"/>
+        <a:font script="Talu" typeface="Microsoft New Tai Lue"/>
+        <a:font script="Tfng" typeface="Ebrima"/>
+      </a:minorFont>
+    </a:fontScheme>
+    <a:fmtScheme name="Office">
+      <a:fillStyleLst>
+        <a:solidFill>
+          <a:schemeClr val="phClr"/>
+        </a:solidFill>
+        <a:gradFill rotWithShape="1">
+          <a:gsLst>
+            <a:gs pos="0">
+              <a:schemeClr val="phClr">
+                <a:lumMod val="110000"/>
+                <a:satMod val="105000"/>
+                <a:tint val="67000"/>
+              </a:schemeClr>
+            </a:gs>
+            <a:gs pos="50000">
+              <a:schemeClr val="phClr">
+                <a:lumMod val="105000"/>
+                <a:satMod val="103000"/>
+                <a:tint val="73000"/>
+              </a:schemeClr>
+            </a:gs>
+            <a:gs pos="100000">
+              <a:schemeClr val="phClr">
+                <a:lumMod val="105000"/>
+                <a:satMod val="109000"/>
+                <a:tint val="81000"/>
+              </a:schemeClr>
+            </a:gs>
+          </a:gsLst>
+          <a:lin ang="5400000" scaled="0"/>
+        </a:gradFill>
+        <a:gradFill rotWithShape="1">
+          <a:gsLst>
+            <a:gs pos="0">
+              <a:schemeClr val="phClr">
+                <a:satMod val="103000"/>
+                <a:lumMod val="102000"/>
+                <a:tint val="94000"/>
+              </a:schemeClr>
+            </a:gs>
+            <a:gs pos="50000">
+              <a:schemeClr val="phClr">
+                <a:satMod val="110000"/>
+                <a:lumMod val="100000"/>
+                <a:shade val="100000"/>
+              </a:schemeClr>
+            </a:gs>
+            <a:gs pos="100000">
+              <a:schemeClr val="phClr">
+                <a:lumMod val="99000"/>
+                <a:satMod val="120000"/>
+                <a:shade val="78000"/>
+              </a:schemeClr>
+            </a:gs>
+          </a:gsLst>
+          <a:lin ang="5400000" scaled="0"/>
+        </a:gradFill>
+      </a:fillStyleLst>
+      <a:lnStyleLst>
+        <a:ln w="6350" cap="flat" cmpd="sng" algn="ctr">
+          <a:solidFill>
+            <a:schemeClr val="phClr"/>
+          </a:solidFill>
+          <a:prstDash val="solid"/>
+          <a:miter lim="800000"/>
+        </a:ln>
+        <a:ln w="12700" cap="flat" cmpd="sng" algn="ctr">
+          <a:solidFill>
+            <a:schemeClr val="phClr"/>
+          </a:solidFill>
+          <a:prstDash val="solid"/>
+          <a:miter lim="800000"/>
+        </a:ln>
+        <a:ln w="19050" cap="flat" cmpd="sng" algn="ctr">
+          <a:solidFill>
+            <a:schemeClr val="phClr"/>
+          </a:solidFill>
+          <a:prstDash val="solid"/>
+          <a:miter lim="800000"/>
+        </a:ln>
+      </a:lnStyleLst>
+      <a:effectStyleLst>
+        <a:effectStyle>
+          <a:effectLst/>
+        </a:effectStyle>
+        <a:effectStyle>
+          <a:effectLst/>
+        </a:effectStyle>
+        <a:effectStyle>
+          <a:effectLst>
+            <a:outerShdw blurRad="57150" dist="19050" dir="5400000" algn="ctr" rotWithShape="0">
+              <a:srgbClr val="000000">
+                <a:alpha val="63000"/>
+              </a:srgbClr>
+            </a:outerShdw>
+          </a:effectLst>
+        </a:effectStyle>
+      </a:effectStyleLst>
+      <a:bgFillStyleLst>
+        <a:solidFill>
+          <a:schemeClr val="phClr"/>
+        </a:solidFill>
+        <a:solidFill>
+          <a:schemeClr val="phClr">
+            <a:tint val="95000"/>
+            <a:satMod val="170000"/>
+          </a:schemeClr>
+        </a:solidFill>
+        <a:gradFill rotWithShape="1">
+          <a:gsLst>
+            <a:gs pos="0">
+              <a:schemeClr val="phClr">
+                <a:tint val="93000"/>
+                <a:satMod val="150000"/>
+                <a:shade val="98000"/>
+                <a:lumMod val="102000"/>
+              </a:schemeClr>
+            </a:gs>
+            <a:gs pos="50000">
+              <a:schemeClr val="phClr">
+                <a:tint val="98000"/>
+                <a:satMod val="130000"/>
+                <a:shade val="90000"/>
+                <a:lumMod val="103000"/>
+              </a:schemeClr>
+            </a:gs>
+            <a:gs pos="100000">
+              <a:schemeClr val="phClr">
+                <a:shade val="63000"/>
+                <a:satMod val="120000"/>
+              </a:schemeClr>
+            </a:gs>
+          </a:gsLst>
+          <a:lin ang="5400000" scaled="0"/>
+        </a:gradFill>
+      </a:bgFillStyleLst>
+    </a:fmtScheme>
+  </a:themeElements>
+  <a:objectDefaults/>
+  <a:extraClrSchemeLst/>
+  <a:extLst>
+    <a:ext uri="{05A4C25C-085E-4340-85A3-A5531E510DB2}">
+      <thm15:themeFamily xmlns:thm15="http://schemas.microsoft.com/office/thememl/2012/main" name="Office Theme" id="{62F939B6-93AF-4DB8-9C6B-D6C7DFDC589F}" vid="{4A3C46E8-61CC-4603-A589-7422A47A8E4A}"/>
+    </a:ext>
+  </a:extLst>
+</a:theme>
 </file>
</xml_diff>